<commit_message>
alterei o slide (2º slide, BD, Simulador
</commit_message>
<xml_diff>
--- a/Power Point/Sprint1.pptx
+++ b/Power Point/Sprint1.pptx
@@ -6,14 +6,16 @@
   </p:sldMasterIdLst>
   <p:sldIdLst>
     <p:sldId id="256" r:id="rId2"/>
-    <p:sldId id="265" r:id="rId3"/>
-    <p:sldId id="257" r:id="rId4"/>
-    <p:sldId id="258" r:id="rId5"/>
-    <p:sldId id="259" r:id="rId6"/>
-    <p:sldId id="264" r:id="rId7"/>
-    <p:sldId id="263" r:id="rId8"/>
-    <p:sldId id="261" r:id="rId9"/>
-    <p:sldId id="262" r:id="rId10"/>
+    <p:sldId id="257" r:id="rId3"/>
+    <p:sldId id="258" r:id="rId4"/>
+    <p:sldId id="259" r:id="rId5"/>
+    <p:sldId id="264" r:id="rId6"/>
+    <p:sldId id="263" r:id="rId7"/>
+    <p:sldId id="261" r:id="rId8"/>
+    <p:sldId id="265" r:id="rId9"/>
+    <p:sldId id="266" r:id="rId10"/>
+    <p:sldId id="267" r:id="rId11"/>
+    <p:sldId id="262" r:id="rId12"/>
   </p:sldIdLst>
   <p:sldSz cx="12192000" cy="6858000"/>
   <p:notesSz cx="6858000" cy="9144000"/>
@@ -1829,7 +1831,7 @@
 <dgm:dataModel xmlns:dgm="http://schemas.openxmlformats.org/drawingml/2006/diagram" xmlns:a="http://schemas.openxmlformats.org/drawingml/2006/main">
   <dgm:ptLst>
     <dgm:pt modelId="{00E04DC4-7630-411C-B502-849706AF7186}" type="doc">
-      <dgm:prSet loTypeId="urn:microsoft.com/office/officeart/2018/2/layout/IconLabelList" loCatId="icon" qsTypeId="urn:microsoft.com/office/officeart/2005/8/quickstyle/simple1" qsCatId="simple" csTypeId="urn:microsoft.com/office/officeart/2018/5/colors/Iconchunking_neutralbg_colorful1" csCatId="colorful" phldr="1"/>
+      <dgm:prSet loTypeId="urn:microsoft.com/office/officeart/2018/2/layout/IconVerticalSolidList" loCatId="icon" qsTypeId="urn:microsoft.com/office/officeart/2005/8/quickstyle/simple1" qsCatId="simple" csTypeId="urn:microsoft.com/office/officeart/2018/5/colors/Iconchunking_neutralbg_colorful1" csCatId="colorful" phldr="1"/>
       <dgm:spPr/>
       <dgm:t>
         <a:bodyPr/>
@@ -1846,11 +1848,16 @@
         <a:bodyPr/>
         <a:lstStyle/>
         <a:p>
+          <a:pPr>
+            <a:lnSpc>
+              <a:spcPct val="100000"/>
+            </a:lnSpc>
+          </a:pPr>
           <a:r>
-            <a:rPr lang="pt-BR" dirty="0"/>
+            <a:rPr lang="pt-BR"/>
             <a:t>O vinho é uma bebida muito clássica e muito sofisticada, mas também tem um processo de maturação bem definido;</a:t>
           </a:r>
-          <a:endParaRPr lang="en-US" dirty="0"/>
+          <a:endParaRPr lang="en-US"/>
         </a:p>
       </dgm:t>
     </dgm:pt>
@@ -1883,11 +1890,16 @@
         <a:bodyPr/>
         <a:lstStyle/>
         <a:p>
+          <a:pPr>
+            <a:lnSpc>
+              <a:spcPct val="100000"/>
+            </a:lnSpc>
+          </a:pPr>
           <a:r>
-            <a:rPr lang="pt-BR" dirty="0"/>
+            <a:rPr lang="pt-BR"/>
             <a:t>O principal desafio é manter o vinho em processo de maturação em uma temperatura e umidade ideais para um bom envelhecimento;</a:t>
           </a:r>
-          <a:endParaRPr lang="en-US" dirty="0"/>
+          <a:endParaRPr lang="en-US"/>
         </a:p>
       </dgm:t>
     </dgm:pt>
@@ -1920,6 +1932,11 @@
         <a:bodyPr/>
         <a:lstStyle/>
         <a:p>
+          <a:pPr>
+            <a:lnSpc>
+              <a:spcPct val="100000"/>
+            </a:lnSpc>
+          </a:pPr>
           <a:r>
             <a:rPr lang="pt-BR"/>
             <a:t>O problema esta justamente nesse controle de temperatura, pois uma alteração brusca na temperatura e umidade afeta na qualidade do vinho, podendo levar a perda total do seu produto.</a:t>
@@ -1950,7 +1967,7 @@
         </a:p>
       </dgm:t>
     </dgm:pt>
-    <dgm:pt modelId="{17EE2350-D99E-4990-92D4-846337297CC2}" type="pres">
+    <dgm:pt modelId="{770EE8F9-9FF1-486C-BD27-8E28B83D7F9E}" type="pres">
       <dgm:prSet presAssocID="{00E04DC4-7630-411C-B502-849706AF7186}" presName="root" presStyleCnt="0">
         <dgm:presLayoutVars>
           <dgm:dir/>
@@ -1959,12 +1976,16 @@
       </dgm:prSet>
       <dgm:spPr/>
     </dgm:pt>
-    <dgm:pt modelId="{1382FBE0-D4C5-4532-A193-52DB84EF3FCB}" type="pres">
+    <dgm:pt modelId="{4E5B32DD-B2BE-452B-BCFE-FBDCA052CF78}" type="pres">
       <dgm:prSet presAssocID="{132BC6D8-CC23-4734-848F-0811FEC25F17}" presName="compNode" presStyleCnt="0"/>
       <dgm:spPr/>
     </dgm:pt>
-    <dgm:pt modelId="{27684242-60EE-4B85-BACF-64BA3B2532F8}" type="pres">
-      <dgm:prSet presAssocID="{132BC6D8-CC23-4734-848F-0811FEC25F17}" presName="iconRect" presStyleLbl="node1" presStyleIdx="0" presStyleCnt="3" custLinFactX="100000" custLinFactNeighborX="160994" custLinFactNeighborY="-689"/>
+    <dgm:pt modelId="{B2ECD81F-E591-4EC2-9D3D-5AA92645B0B1}" type="pres">
+      <dgm:prSet presAssocID="{132BC6D8-CC23-4734-848F-0811FEC25F17}" presName="bgRect" presStyleLbl="bgShp" presStyleIdx="0" presStyleCnt="3"/>
+      <dgm:spPr/>
+    </dgm:pt>
+    <dgm:pt modelId="{9F4D3B3D-5DCF-47BF-9153-6B2BBBAEDAE4}" type="pres">
+      <dgm:prSet presAssocID="{132BC6D8-CC23-4734-848F-0811FEC25F17}" presName="iconRect" presStyleLbl="node1" presStyleIdx="0" presStyleCnt="3"/>
       <dgm:spPr>
         <a:blipFill>
           <a:blip xmlns:r="http://schemas.openxmlformats.org/officeDocument/2006/relationships" r:embed="rId1">
@@ -1987,91 +2008,79 @@
       </dgm:spPr>
       <dgm:extLst>
         <a:ext uri="{E40237B7-FDA0-4F09-8148-C483321AD2D9}">
-          <dgm14:cNvPr xmlns:dgm14="http://schemas.microsoft.com/office/drawing/2010/diagram" id="0" name="" descr="Vinho"/>
+          <dgm14:cNvPr xmlns:dgm14="http://schemas.microsoft.com/office/drawing/2010/diagram" id="0" name="" descr="Grapes"/>
         </a:ext>
       </dgm:extLst>
     </dgm:pt>
-    <dgm:pt modelId="{FDD00323-6781-45CF-897C-E26FF5021C74}" type="pres">
+    <dgm:pt modelId="{BE6C0916-D1A5-4884-B384-55DF7E794490}" type="pres">
       <dgm:prSet presAssocID="{132BC6D8-CC23-4734-848F-0811FEC25F17}" presName="spaceRect" presStyleCnt="0"/>
       <dgm:spPr/>
     </dgm:pt>
-    <dgm:pt modelId="{201E1D27-4ADE-479A-9B3E-B307CAC0ADE0}" type="pres">
-      <dgm:prSet presAssocID="{132BC6D8-CC23-4734-848F-0811FEC25F17}" presName="textRect" presStyleLbl="revTx" presStyleIdx="0" presStyleCnt="3">
+    <dgm:pt modelId="{EC33A912-EDA9-4495-9D28-B18555976457}" type="pres">
+      <dgm:prSet presAssocID="{132BC6D8-CC23-4734-848F-0811FEC25F17}" presName="parTx" presStyleLbl="revTx" presStyleIdx="0" presStyleCnt="3">
         <dgm:presLayoutVars>
-          <dgm:chMax val="1"/>
-          <dgm:chPref val="1"/>
+          <dgm:chMax val="0"/>
+          <dgm:chPref val="0"/>
         </dgm:presLayoutVars>
       </dgm:prSet>
       <dgm:spPr/>
     </dgm:pt>
-    <dgm:pt modelId="{ED3C3F53-6EC7-42EB-95AD-5536F8571552}" type="pres">
+    <dgm:pt modelId="{EBBAB168-8F39-4B12-80F0-B5A4482AF979}" type="pres">
       <dgm:prSet presAssocID="{0080418F-F9FA-4B4C-807E-01C9DBA9163A}" presName="sibTrans" presStyleCnt="0"/>
       <dgm:spPr/>
     </dgm:pt>
-    <dgm:pt modelId="{255D2F06-E643-42B0-96C3-17C70FEE1BCD}" type="pres">
+    <dgm:pt modelId="{4DCAB357-EDCA-4EFF-99D1-B07D4351CCBD}" type="pres">
       <dgm:prSet presAssocID="{0015E645-DA30-425F-845B-29629959BE39}" presName="compNode" presStyleCnt="0"/>
       <dgm:spPr/>
     </dgm:pt>
-    <dgm:pt modelId="{161A5793-0C73-4185-ADDB-5A1C41F63EE2}" type="pres">
-      <dgm:prSet presAssocID="{0015E645-DA30-425F-845B-29629959BE39}" presName="iconRect" presStyleLbl="node1" presStyleIdx="1" presStyleCnt="3" custLinFactX="-100000" custLinFactNeighborX="-160887" custLinFactNeighborY="-872"/>
+    <dgm:pt modelId="{7EAC6179-A665-4394-AC73-A27CA594D66E}" type="pres">
+      <dgm:prSet presAssocID="{0015E645-DA30-425F-845B-29629959BE39}" presName="bgRect" presStyleLbl="bgShp" presStyleIdx="1" presStyleCnt="3"/>
+      <dgm:spPr/>
+    </dgm:pt>
+    <dgm:pt modelId="{68874E66-C28B-45AC-B44D-49B977AA6F31}" type="pres">
+      <dgm:prSet presAssocID="{0015E645-DA30-425F-845B-29629959BE39}" presName="iconRect" presStyleLbl="node1" presStyleIdx="1" presStyleCnt="3" custLinFactX="112820" custLinFactY="100000" custLinFactNeighborX="200000" custLinFactNeighborY="148968"/>
       <dgm:spPr>
-        <a:blipFill>
-          <a:blip xmlns:r="http://schemas.openxmlformats.org/officeDocument/2006/relationships" r:embed="rId3">
-            <a:extLst>
-              <a:ext uri="{28A0092B-C50C-407E-A947-70E740481C1C}">
-                <a14:useLocalDpi xmlns:a14="http://schemas.microsoft.com/office/drawing/2010/main" val="0"/>
-              </a:ext>
-              <a:ext uri="{96DAC541-7B7A-43D3-8B79-37D633B846F1}">
-                <asvg:svgBlip xmlns:asvg="http://schemas.microsoft.com/office/drawing/2016/SVG/main" r:embed="rId4"/>
-              </a:ext>
-            </a:extLst>
-          </a:blip>
-          <a:stretch>
-            <a:fillRect/>
-          </a:stretch>
-        </a:blipFill>
         <a:ln>
           <a:noFill/>
         </a:ln>
       </dgm:spPr>
-      <dgm:extLst>
-        <a:ext uri="{E40237B7-FDA0-4F09-8148-C483321AD2D9}">
-          <dgm14:cNvPr xmlns:dgm14="http://schemas.microsoft.com/office/drawing/2010/diagram" id="0" name="" descr="Uvas"/>
-        </a:ext>
-      </dgm:extLst>
     </dgm:pt>
-    <dgm:pt modelId="{EC85CFA9-6AA5-4545-A924-38BBAAB1BB13}" type="pres">
+    <dgm:pt modelId="{EB2D2FB1-95DE-45C0-835D-0CB723B3AB1A}" type="pres">
       <dgm:prSet presAssocID="{0015E645-DA30-425F-845B-29629959BE39}" presName="spaceRect" presStyleCnt="0"/>
       <dgm:spPr/>
     </dgm:pt>
-    <dgm:pt modelId="{D5A8AB6D-80AE-46D3-99C1-4E490037A6EA}" type="pres">
-      <dgm:prSet presAssocID="{0015E645-DA30-425F-845B-29629959BE39}" presName="textRect" presStyleLbl="revTx" presStyleIdx="1" presStyleCnt="3">
+    <dgm:pt modelId="{62C893C0-9CF6-4E31-B5A1-B6F7DB126B99}" type="pres">
+      <dgm:prSet presAssocID="{0015E645-DA30-425F-845B-29629959BE39}" presName="parTx" presStyleLbl="revTx" presStyleIdx="1" presStyleCnt="3">
         <dgm:presLayoutVars>
-          <dgm:chMax val="1"/>
-          <dgm:chPref val="1"/>
+          <dgm:chMax val="0"/>
+          <dgm:chPref val="0"/>
         </dgm:presLayoutVars>
       </dgm:prSet>
       <dgm:spPr/>
     </dgm:pt>
-    <dgm:pt modelId="{3F89C2AF-E601-4153-AC2C-5DAC640DB5BB}" type="pres">
+    <dgm:pt modelId="{CD30471E-9C9D-4105-9553-3E0F4E9A75C8}" type="pres">
       <dgm:prSet presAssocID="{76D14859-F0D4-4A0B-8DE3-8E700990AB41}" presName="sibTrans" presStyleCnt="0"/>
       <dgm:spPr/>
     </dgm:pt>
-    <dgm:pt modelId="{155019F8-438C-4AC0-97C9-4961A31CB7C3}" type="pres">
+    <dgm:pt modelId="{00EB9DC4-D01F-4733-88B7-B5073713A520}" type="pres">
       <dgm:prSet presAssocID="{7D1E1264-4E7F-47C1-B794-AF63FDFB8C20}" presName="compNode" presStyleCnt="0"/>
       <dgm:spPr/>
     </dgm:pt>
-    <dgm:pt modelId="{8E72D609-285F-4084-9C88-2BDE423A2606}" type="pres">
+    <dgm:pt modelId="{4E411C41-F318-4C88-A7EC-C0217FC54FC3}" type="pres">
+      <dgm:prSet presAssocID="{7D1E1264-4E7F-47C1-B794-AF63FDFB8C20}" presName="bgRect" presStyleLbl="bgShp" presStyleIdx="2" presStyleCnt="3"/>
+      <dgm:spPr/>
+    </dgm:pt>
+    <dgm:pt modelId="{1D312433-7812-4562-B83E-331A635F9BBB}" type="pres">
       <dgm:prSet presAssocID="{7D1E1264-4E7F-47C1-B794-AF63FDFB8C20}" presName="iconRect" presStyleLbl="node1" presStyleIdx="2" presStyleCnt="3"/>
       <dgm:spPr>
         <a:blipFill>
-          <a:blip xmlns:r="http://schemas.openxmlformats.org/officeDocument/2006/relationships" r:embed="rId5">
+          <a:blip xmlns:r="http://schemas.openxmlformats.org/officeDocument/2006/relationships" r:embed="rId3">
             <a:extLst>
               <a:ext uri="{28A0092B-C50C-407E-A947-70E740481C1C}">
                 <a14:useLocalDpi xmlns:a14="http://schemas.microsoft.com/office/drawing/2010/main" val="0"/>
               </a:ext>
               <a:ext uri="{96DAC541-7B7A-43D3-8B79-37D633B846F1}">
-                <asvg:svgBlip xmlns:asvg="http://schemas.microsoft.com/office/drawing/2016/SVG/main" r:embed="rId6"/>
+                <asvg:svgBlip xmlns:asvg="http://schemas.microsoft.com/office/drawing/2016/SVG/main" r:embed="rId4"/>
               </a:ext>
             </a:extLst>
           </a:blip>
@@ -2089,15 +2098,15 @@
         </a:ext>
       </dgm:extLst>
     </dgm:pt>
-    <dgm:pt modelId="{32F9003F-EC10-49A3-A43D-E3FC328BC5D4}" type="pres">
+    <dgm:pt modelId="{EC332367-AE38-4169-9A18-1E7538524912}" type="pres">
       <dgm:prSet presAssocID="{7D1E1264-4E7F-47C1-B794-AF63FDFB8C20}" presName="spaceRect" presStyleCnt="0"/>
       <dgm:spPr/>
     </dgm:pt>
-    <dgm:pt modelId="{4FD25476-AB13-4C7F-8BEB-B818B15DB8EC}" type="pres">
-      <dgm:prSet presAssocID="{7D1E1264-4E7F-47C1-B794-AF63FDFB8C20}" presName="textRect" presStyleLbl="revTx" presStyleIdx="2" presStyleCnt="3">
+    <dgm:pt modelId="{BECCE7AB-2A47-4810-AFCD-9AA6F6444A9D}" type="pres">
+      <dgm:prSet presAssocID="{7D1E1264-4E7F-47C1-B794-AF63FDFB8C20}" presName="parTx" presStyleLbl="revTx" presStyleIdx="2" presStyleCnt="3">
         <dgm:presLayoutVars>
-          <dgm:chMax val="1"/>
-          <dgm:chPref val="1"/>
+          <dgm:chMax val="0"/>
+          <dgm:chPref val="0"/>
         </dgm:presLayoutVars>
       </dgm:prSet>
       <dgm:spPr/>
@@ -2105,32 +2114,35 @@
   </dgm:ptLst>
   <dgm:cxnLst>
     <dgm:cxn modelId="{7D2EC304-062A-4E59-8371-849C036A567D}" srcId="{00E04DC4-7630-411C-B502-849706AF7186}" destId="{7D1E1264-4E7F-47C1-B794-AF63FDFB8C20}" srcOrd="2" destOrd="0" parTransId="{511B1963-8311-4572-8AE4-0258DCEA7746}" sibTransId="{A3D5EE71-1533-4ECF-97EF-E3B11CBD10C0}"/>
-    <dgm:cxn modelId="{B4A77008-FA62-4152-B624-08DBF4AD6BF3}" type="presOf" srcId="{132BC6D8-CC23-4734-848F-0811FEC25F17}" destId="{201E1D27-4ADE-479A-9B3E-B307CAC0ADE0}" srcOrd="0" destOrd="0" presId="urn:microsoft.com/office/officeart/2018/2/layout/IconLabelList"/>
-    <dgm:cxn modelId="{A8071F61-0F60-44D4-ABC4-82834CD94405}" type="presOf" srcId="{7D1E1264-4E7F-47C1-B794-AF63FDFB8C20}" destId="{4FD25476-AB13-4C7F-8BEB-B818B15DB8EC}" srcOrd="0" destOrd="0" presId="urn:microsoft.com/office/officeart/2018/2/layout/IconLabelList"/>
+    <dgm:cxn modelId="{ACF13C72-35BA-483D-BDE2-4738D3E3A441}" type="presOf" srcId="{7D1E1264-4E7F-47C1-B794-AF63FDFB8C20}" destId="{BECCE7AB-2A47-4810-AFCD-9AA6F6444A9D}" srcOrd="0" destOrd="0" presId="urn:microsoft.com/office/officeart/2018/2/layout/IconVerticalSolidList"/>
     <dgm:cxn modelId="{BCFF6072-DFD0-4FF3-9587-F7F3025E73ED}" srcId="{00E04DC4-7630-411C-B502-849706AF7186}" destId="{0015E645-DA30-425F-845B-29629959BE39}" srcOrd="1" destOrd="0" parTransId="{B3D2BB78-1A9C-44AE-AE58-78EB53F3B554}" sibTransId="{76D14859-F0D4-4A0B-8DE3-8E700990AB41}"/>
-    <dgm:cxn modelId="{E6BA4152-AB62-4DAB-9BCB-28524AE8AFE8}" type="presOf" srcId="{00E04DC4-7630-411C-B502-849706AF7186}" destId="{17EE2350-D99E-4990-92D4-846337297CC2}" srcOrd="0" destOrd="0" presId="urn:microsoft.com/office/officeart/2018/2/layout/IconLabelList"/>
+    <dgm:cxn modelId="{6A0F8674-2F7D-4312-BD1B-6EB65D8B961C}" type="presOf" srcId="{132BC6D8-CC23-4734-848F-0811FEC25F17}" destId="{EC33A912-EDA9-4495-9D28-B18555976457}" srcOrd="0" destOrd="0" presId="urn:microsoft.com/office/officeart/2018/2/layout/IconVerticalSolidList"/>
     <dgm:cxn modelId="{AA83DA58-6D20-4A19-96FC-1EB9D33A039F}" srcId="{00E04DC4-7630-411C-B502-849706AF7186}" destId="{132BC6D8-CC23-4734-848F-0811FEC25F17}" srcOrd="0" destOrd="0" parTransId="{AE8DA907-AD63-4871-B2B8-2AA0E2CA279D}" sibTransId="{0080418F-F9FA-4B4C-807E-01C9DBA9163A}"/>
-    <dgm:cxn modelId="{0479C4C9-DE4B-4218-809F-5D99130612F3}" type="presOf" srcId="{0015E645-DA30-425F-845B-29629959BE39}" destId="{D5A8AB6D-80AE-46D3-99C1-4E490037A6EA}" srcOrd="0" destOrd="0" presId="urn:microsoft.com/office/officeart/2018/2/layout/IconLabelList"/>
-    <dgm:cxn modelId="{A8EB50D9-E55E-443F-875E-2F1D16FD4B86}" type="presParOf" srcId="{17EE2350-D99E-4990-92D4-846337297CC2}" destId="{1382FBE0-D4C5-4532-A193-52DB84EF3FCB}" srcOrd="0" destOrd="0" presId="urn:microsoft.com/office/officeart/2018/2/layout/IconLabelList"/>
-    <dgm:cxn modelId="{81AF4DC8-50C4-478F-BC96-66553A526202}" type="presParOf" srcId="{1382FBE0-D4C5-4532-A193-52DB84EF3FCB}" destId="{27684242-60EE-4B85-BACF-64BA3B2532F8}" srcOrd="0" destOrd="0" presId="urn:microsoft.com/office/officeart/2018/2/layout/IconLabelList"/>
-    <dgm:cxn modelId="{0026C9F7-8D01-4CD8-9D48-57CB50A74B81}" type="presParOf" srcId="{1382FBE0-D4C5-4532-A193-52DB84EF3FCB}" destId="{FDD00323-6781-45CF-897C-E26FF5021C74}" srcOrd="1" destOrd="0" presId="urn:microsoft.com/office/officeart/2018/2/layout/IconLabelList"/>
-    <dgm:cxn modelId="{DE03B841-BA41-4849-BF36-334A0B3A238C}" type="presParOf" srcId="{1382FBE0-D4C5-4532-A193-52DB84EF3FCB}" destId="{201E1D27-4ADE-479A-9B3E-B307CAC0ADE0}" srcOrd="2" destOrd="0" presId="urn:microsoft.com/office/officeart/2018/2/layout/IconLabelList"/>
-    <dgm:cxn modelId="{DAD988FD-DAD1-4323-AADB-D265C5CF9876}" type="presParOf" srcId="{17EE2350-D99E-4990-92D4-846337297CC2}" destId="{ED3C3F53-6EC7-42EB-95AD-5536F8571552}" srcOrd="1" destOrd="0" presId="urn:microsoft.com/office/officeart/2018/2/layout/IconLabelList"/>
-    <dgm:cxn modelId="{FD169C3D-49DE-4358-BAF9-BF447276E06B}" type="presParOf" srcId="{17EE2350-D99E-4990-92D4-846337297CC2}" destId="{255D2F06-E643-42B0-96C3-17C70FEE1BCD}" srcOrd="2" destOrd="0" presId="urn:microsoft.com/office/officeart/2018/2/layout/IconLabelList"/>
-    <dgm:cxn modelId="{CF46B741-828D-423B-B82B-0A893295DBDF}" type="presParOf" srcId="{255D2F06-E643-42B0-96C3-17C70FEE1BCD}" destId="{161A5793-0C73-4185-ADDB-5A1C41F63EE2}" srcOrd="0" destOrd="0" presId="urn:microsoft.com/office/officeart/2018/2/layout/IconLabelList"/>
-    <dgm:cxn modelId="{F0C82125-427F-4A03-AF92-4719A56219F9}" type="presParOf" srcId="{255D2F06-E643-42B0-96C3-17C70FEE1BCD}" destId="{EC85CFA9-6AA5-4545-A924-38BBAAB1BB13}" srcOrd="1" destOrd="0" presId="urn:microsoft.com/office/officeart/2018/2/layout/IconLabelList"/>
-    <dgm:cxn modelId="{FC7CCDD9-C12B-4D1E-B96F-D7E0D789EE6C}" type="presParOf" srcId="{255D2F06-E643-42B0-96C3-17C70FEE1BCD}" destId="{D5A8AB6D-80AE-46D3-99C1-4E490037A6EA}" srcOrd="2" destOrd="0" presId="urn:microsoft.com/office/officeart/2018/2/layout/IconLabelList"/>
-    <dgm:cxn modelId="{8BC46473-54D8-40EC-97B7-3BAD7D00311F}" type="presParOf" srcId="{17EE2350-D99E-4990-92D4-846337297CC2}" destId="{3F89C2AF-E601-4153-AC2C-5DAC640DB5BB}" srcOrd="3" destOrd="0" presId="urn:microsoft.com/office/officeart/2018/2/layout/IconLabelList"/>
-    <dgm:cxn modelId="{3AC72B9B-2837-4A75-8117-D90AC994CA6A}" type="presParOf" srcId="{17EE2350-D99E-4990-92D4-846337297CC2}" destId="{155019F8-438C-4AC0-97C9-4961A31CB7C3}" srcOrd="4" destOrd="0" presId="urn:microsoft.com/office/officeart/2018/2/layout/IconLabelList"/>
-    <dgm:cxn modelId="{C75344B5-EC63-4E3F-8683-376C24EDDF9A}" type="presParOf" srcId="{155019F8-438C-4AC0-97C9-4961A31CB7C3}" destId="{8E72D609-285F-4084-9C88-2BDE423A2606}" srcOrd="0" destOrd="0" presId="urn:microsoft.com/office/officeart/2018/2/layout/IconLabelList"/>
-    <dgm:cxn modelId="{692E62FE-D535-4A4C-BDC9-879C43B7215E}" type="presParOf" srcId="{155019F8-438C-4AC0-97C9-4961A31CB7C3}" destId="{32F9003F-EC10-49A3-A43D-E3FC328BC5D4}" srcOrd="1" destOrd="0" presId="urn:microsoft.com/office/officeart/2018/2/layout/IconLabelList"/>
-    <dgm:cxn modelId="{7E98D91D-3F5F-4B5B-BA1D-724977116809}" type="presParOf" srcId="{155019F8-438C-4AC0-97C9-4961A31CB7C3}" destId="{4FD25476-AB13-4C7F-8BEB-B818B15DB8EC}" srcOrd="2" destOrd="0" presId="urn:microsoft.com/office/officeart/2018/2/layout/IconLabelList"/>
+    <dgm:cxn modelId="{8D4EA2A7-9786-4928-8B86-4B86A4706389}" type="presOf" srcId="{0015E645-DA30-425F-845B-29629959BE39}" destId="{62C893C0-9CF6-4E31-B5A1-B6F7DB126B99}" srcOrd="0" destOrd="0" presId="urn:microsoft.com/office/officeart/2018/2/layout/IconVerticalSolidList"/>
+    <dgm:cxn modelId="{ECB06BF8-6EE5-4AE4-A470-E78D36C4AA13}" type="presOf" srcId="{00E04DC4-7630-411C-B502-849706AF7186}" destId="{770EE8F9-9FF1-486C-BD27-8E28B83D7F9E}" srcOrd="0" destOrd="0" presId="urn:microsoft.com/office/officeart/2018/2/layout/IconVerticalSolidList"/>
+    <dgm:cxn modelId="{BBC0D963-F8C9-4858-B82E-D56A9CE6F70B}" type="presParOf" srcId="{770EE8F9-9FF1-486C-BD27-8E28B83D7F9E}" destId="{4E5B32DD-B2BE-452B-BCFE-FBDCA052CF78}" srcOrd="0" destOrd="0" presId="urn:microsoft.com/office/officeart/2018/2/layout/IconVerticalSolidList"/>
+    <dgm:cxn modelId="{95A556DE-B30D-4A12-99C1-4A85B5D502FA}" type="presParOf" srcId="{4E5B32DD-B2BE-452B-BCFE-FBDCA052CF78}" destId="{B2ECD81F-E591-4EC2-9D3D-5AA92645B0B1}" srcOrd="0" destOrd="0" presId="urn:microsoft.com/office/officeart/2018/2/layout/IconVerticalSolidList"/>
+    <dgm:cxn modelId="{E41D5DF3-156D-4D7A-9F8D-11BEDC75E41F}" type="presParOf" srcId="{4E5B32DD-B2BE-452B-BCFE-FBDCA052CF78}" destId="{9F4D3B3D-5DCF-47BF-9153-6B2BBBAEDAE4}" srcOrd="1" destOrd="0" presId="urn:microsoft.com/office/officeart/2018/2/layout/IconVerticalSolidList"/>
+    <dgm:cxn modelId="{A0E7580D-7207-4356-A66C-6F16150D4479}" type="presParOf" srcId="{4E5B32DD-B2BE-452B-BCFE-FBDCA052CF78}" destId="{BE6C0916-D1A5-4884-B384-55DF7E794490}" srcOrd="2" destOrd="0" presId="urn:microsoft.com/office/officeart/2018/2/layout/IconVerticalSolidList"/>
+    <dgm:cxn modelId="{E55D4F67-8744-41A1-BB0E-6CE3B3F64DC9}" type="presParOf" srcId="{4E5B32DD-B2BE-452B-BCFE-FBDCA052CF78}" destId="{EC33A912-EDA9-4495-9D28-B18555976457}" srcOrd="3" destOrd="0" presId="urn:microsoft.com/office/officeart/2018/2/layout/IconVerticalSolidList"/>
+    <dgm:cxn modelId="{4321E126-E83C-40C6-91BD-133FB75DC85A}" type="presParOf" srcId="{770EE8F9-9FF1-486C-BD27-8E28B83D7F9E}" destId="{EBBAB168-8F39-4B12-80F0-B5A4482AF979}" srcOrd="1" destOrd="0" presId="urn:microsoft.com/office/officeart/2018/2/layout/IconVerticalSolidList"/>
+    <dgm:cxn modelId="{9DD5A7B9-B903-4633-BF50-3C195775719E}" type="presParOf" srcId="{770EE8F9-9FF1-486C-BD27-8E28B83D7F9E}" destId="{4DCAB357-EDCA-4EFF-99D1-B07D4351CCBD}" srcOrd="2" destOrd="0" presId="urn:microsoft.com/office/officeart/2018/2/layout/IconVerticalSolidList"/>
+    <dgm:cxn modelId="{9E51DB14-4602-4B0E-862F-927935427AF6}" type="presParOf" srcId="{4DCAB357-EDCA-4EFF-99D1-B07D4351CCBD}" destId="{7EAC6179-A665-4394-AC73-A27CA594D66E}" srcOrd="0" destOrd="0" presId="urn:microsoft.com/office/officeart/2018/2/layout/IconVerticalSolidList"/>
+    <dgm:cxn modelId="{C5F07707-86E5-4009-BE8C-A94F41AEEFD7}" type="presParOf" srcId="{4DCAB357-EDCA-4EFF-99D1-B07D4351CCBD}" destId="{68874E66-C28B-45AC-B44D-49B977AA6F31}" srcOrd="1" destOrd="0" presId="urn:microsoft.com/office/officeart/2018/2/layout/IconVerticalSolidList"/>
+    <dgm:cxn modelId="{3B9B6F18-7E66-4C16-9FD0-4E0E22B05EEA}" type="presParOf" srcId="{4DCAB357-EDCA-4EFF-99D1-B07D4351CCBD}" destId="{EB2D2FB1-95DE-45C0-835D-0CB723B3AB1A}" srcOrd="2" destOrd="0" presId="urn:microsoft.com/office/officeart/2018/2/layout/IconVerticalSolidList"/>
+    <dgm:cxn modelId="{B8550D97-CCC4-43BA-ACFF-D05E6F2EC222}" type="presParOf" srcId="{4DCAB357-EDCA-4EFF-99D1-B07D4351CCBD}" destId="{62C893C0-9CF6-4E31-B5A1-B6F7DB126B99}" srcOrd="3" destOrd="0" presId="urn:microsoft.com/office/officeart/2018/2/layout/IconVerticalSolidList"/>
+    <dgm:cxn modelId="{473B8BCD-EA1F-44F2-A083-4B63E1E1163F}" type="presParOf" srcId="{770EE8F9-9FF1-486C-BD27-8E28B83D7F9E}" destId="{CD30471E-9C9D-4105-9553-3E0F4E9A75C8}" srcOrd="3" destOrd="0" presId="urn:microsoft.com/office/officeart/2018/2/layout/IconVerticalSolidList"/>
+    <dgm:cxn modelId="{C0795D9F-F94F-4216-85C1-EC37A836E454}" type="presParOf" srcId="{770EE8F9-9FF1-486C-BD27-8E28B83D7F9E}" destId="{00EB9DC4-D01F-4733-88B7-B5073713A520}" srcOrd="4" destOrd="0" presId="urn:microsoft.com/office/officeart/2018/2/layout/IconVerticalSolidList"/>
+    <dgm:cxn modelId="{4DA00437-9F87-4FDD-8DFD-6803D067C927}" type="presParOf" srcId="{00EB9DC4-D01F-4733-88B7-B5073713A520}" destId="{4E411C41-F318-4C88-A7EC-C0217FC54FC3}" srcOrd="0" destOrd="0" presId="urn:microsoft.com/office/officeart/2018/2/layout/IconVerticalSolidList"/>
+    <dgm:cxn modelId="{85DF3F06-5EE2-413A-8A74-D4A82DF4DC35}" type="presParOf" srcId="{00EB9DC4-D01F-4733-88B7-B5073713A520}" destId="{1D312433-7812-4562-B83E-331A635F9BBB}" srcOrd="1" destOrd="0" presId="urn:microsoft.com/office/officeart/2018/2/layout/IconVerticalSolidList"/>
+    <dgm:cxn modelId="{2BDEEFB1-05FC-4E78-B39C-B17BE4016E36}" type="presParOf" srcId="{00EB9DC4-D01F-4733-88B7-B5073713A520}" destId="{EC332367-AE38-4169-9A18-1E7538524912}" srcOrd="2" destOrd="0" presId="urn:microsoft.com/office/officeart/2018/2/layout/IconVerticalSolidList"/>
+    <dgm:cxn modelId="{212BD16A-8011-4F7B-ABCE-D459D427A86B}" type="presParOf" srcId="{00EB9DC4-D01F-4733-88B7-B5073713A520}" destId="{BECCE7AB-2A47-4810-AFCD-9AA6F6444A9D}" srcOrd="3" destOrd="0" presId="urn:microsoft.com/office/officeart/2018/2/layout/IconVerticalSolidList"/>
   </dgm:cxnLst>
   <dgm:bg/>
   <dgm:whole/>
   <dgm:extLst>
     <a:ext uri="http://schemas.microsoft.com/office/drawing/2008/diagram">
-      <dsp:dataModelExt xmlns:dsp="http://schemas.microsoft.com/office/drawing/2008/diagram" relId="rId8" minVer="http://schemas.openxmlformats.org/drawingml/2006/diagram"/>
+      <dsp:dataModelExt xmlns:dsp="http://schemas.microsoft.com/office/drawing/2008/diagram" relId="rId7" minVer="http://schemas.openxmlformats.org/drawingml/2006/diagram"/>
     </a:ext>
   </dgm:extLst>
 </dgm:dataModel>
@@ -2666,15 +2678,57 @@
       <dsp:cNvGrpSpPr/>
     </dsp:nvGrpSpPr>
     <dsp:grpSpPr/>
-    <dsp:sp modelId="{27684242-60EE-4B85-BACF-64BA3B2532F8}">
+    <dsp:sp modelId="{B2ECD81F-E591-4EC2-9D3D-5AA92645B0B1}">
       <dsp:nvSpPr>
         <dsp:cNvPr id="0" name=""/>
         <dsp:cNvSpPr/>
       </dsp:nvSpPr>
       <dsp:spPr>
         <a:xfrm>
-          <a:off x="4606151" y="607131"/>
-          <a:ext cx="1300252" cy="1300252"/>
+          <a:off x="0" y="713"/>
+          <a:ext cx="7003777" cy="1669193"/>
+        </a:xfrm>
+        <a:prstGeom prst="roundRect">
+          <a:avLst>
+            <a:gd name="adj" fmla="val 10000"/>
+          </a:avLst>
+        </a:prstGeom>
+        <a:solidFill>
+          <a:schemeClr val="bg1">
+            <a:lumMod val="95000"/>
+            <a:hueOff val="0"/>
+            <a:satOff val="0"/>
+            <a:lumOff val="0"/>
+            <a:alphaOff val="0"/>
+          </a:schemeClr>
+        </a:solidFill>
+        <a:ln>
+          <a:noFill/>
+        </a:ln>
+        <a:effectLst/>
+      </dsp:spPr>
+      <dsp:style>
+        <a:lnRef idx="0">
+          <a:scrgbClr r="0" g="0" b="0"/>
+        </a:lnRef>
+        <a:fillRef idx="1">
+          <a:scrgbClr r="0" g="0" b="0"/>
+        </a:fillRef>
+        <a:effectRef idx="0">
+          <a:scrgbClr r="0" g="0" b="0"/>
+        </a:effectRef>
+        <a:fontRef idx="minor"/>
+      </dsp:style>
+    </dsp:sp>
+    <dsp:sp modelId="{9F4D3B3D-5DCF-47BF-9153-6B2BBBAEDAE4}">
+      <dsp:nvSpPr>
+        <dsp:cNvPr id="0" name=""/>
+        <dsp:cNvSpPr/>
+      </dsp:nvSpPr>
+      <dsp:spPr>
+        <a:xfrm>
+          <a:off x="504931" y="376281"/>
+          <a:ext cx="918056" cy="918056"/>
         </a:xfrm>
         <a:prstGeom prst="rect">
           <a:avLst/>
@@ -2716,15 +2770,15 @@
         </a:fontRef>
       </dsp:style>
     </dsp:sp>
-    <dsp:sp modelId="{201E1D27-4ADE-479A-9B3E-B307CAC0ADE0}">
+    <dsp:sp modelId="{EC33A912-EDA9-4495-9D28-B18555976457}">
       <dsp:nvSpPr>
         <dsp:cNvPr id="0" name=""/>
         <dsp:cNvSpPr/>
       </dsp:nvSpPr>
       <dsp:spPr>
         <a:xfrm>
-          <a:off x="417971" y="2281273"/>
-          <a:ext cx="2889450" cy="765000"/>
+          <a:off x="1927918" y="713"/>
+          <a:ext cx="5075858" cy="1669193"/>
         </a:xfrm>
         <a:prstGeom prst="rect">
           <a:avLst/>
@@ -2748,14 +2802,14 @@
         <a:fontRef idx="minor"/>
       </dsp:style>
       <dsp:txBody>
-        <a:bodyPr spcFirstLastPara="0" vert="horz" wrap="square" lIns="0" tIns="0" rIns="0" bIns="0" numCol="1" spcCol="1270" anchor="t" anchorCtr="0">
+        <a:bodyPr spcFirstLastPara="0" vert="horz" wrap="square" lIns="176656" tIns="176656" rIns="176656" bIns="176656" numCol="1" spcCol="1270" anchor="ctr" anchorCtr="0">
           <a:noAutofit/>
         </a:bodyPr>
         <a:lstStyle/>
         <a:p>
-          <a:pPr marL="0" lvl="0" indent="0" algn="ctr" defTabSz="488950">
+          <a:pPr marL="0" lvl="0" indent="0" algn="l" defTabSz="755650">
             <a:lnSpc>
-              <a:spcPct val="90000"/>
+              <a:spcPct val="100000"/>
             </a:lnSpc>
             <a:spcBef>
               <a:spcPct val="0"/>
@@ -2766,26 +2820,214 @@
             <a:buNone/>
           </a:pPr>
           <a:r>
-            <a:rPr lang="pt-BR" sz="1100" kern="1200" dirty="0"/>
+            <a:rPr lang="pt-BR" sz="1700" kern="1200"/>
             <a:t>O vinho é uma bebida muito clássica e muito sofisticada, mas também tem um processo de maturação bem definido;</a:t>
           </a:r>
-          <a:endParaRPr lang="en-US" sz="1100" kern="1200" dirty="0"/>
+          <a:endParaRPr lang="en-US" sz="1700" kern="1200"/>
         </a:p>
       </dsp:txBody>
       <dsp:txXfrm>
-        <a:off x="417971" y="2281273"/>
-        <a:ext cx="2889450" cy="765000"/>
+        <a:off x="1927918" y="713"/>
+        <a:ext cx="5075858" cy="1669193"/>
       </dsp:txXfrm>
     </dsp:sp>
-    <dsp:sp modelId="{161A5793-0C73-4185-ADDB-5A1C41F63EE2}">
+    <dsp:sp modelId="{7EAC6179-A665-4394-AC73-A27CA594D66E}">
       <dsp:nvSpPr>
         <dsp:cNvPr id="0" name=""/>
         <dsp:cNvSpPr/>
       </dsp:nvSpPr>
       <dsp:spPr>
         <a:xfrm>
-          <a:off x="1215484" y="604751"/>
-          <a:ext cx="1300252" cy="1300252"/>
+          <a:off x="0" y="2087205"/>
+          <a:ext cx="7003777" cy="1669193"/>
+        </a:xfrm>
+        <a:prstGeom prst="roundRect">
+          <a:avLst>
+            <a:gd name="adj" fmla="val 10000"/>
+          </a:avLst>
+        </a:prstGeom>
+        <a:solidFill>
+          <a:schemeClr val="bg1">
+            <a:lumMod val="95000"/>
+            <a:hueOff val="0"/>
+            <a:satOff val="0"/>
+            <a:lumOff val="0"/>
+            <a:alphaOff val="0"/>
+          </a:schemeClr>
+        </a:solidFill>
+        <a:ln>
+          <a:noFill/>
+        </a:ln>
+        <a:effectLst/>
+      </dsp:spPr>
+      <dsp:style>
+        <a:lnRef idx="0">
+          <a:scrgbClr r="0" g="0" b="0"/>
+        </a:lnRef>
+        <a:fillRef idx="1">
+          <a:scrgbClr r="0" g="0" b="0"/>
+        </a:fillRef>
+        <a:effectRef idx="0">
+          <a:scrgbClr r="0" g="0" b="0"/>
+        </a:effectRef>
+        <a:fontRef idx="minor"/>
+      </dsp:style>
+    </dsp:sp>
+    <dsp:sp modelId="{68874E66-C28B-45AC-B44D-49B977AA6F31}">
+      <dsp:nvSpPr>
+        <dsp:cNvPr id="0" name=""/>
+        <dsp:cNvSpPr/>
+      </dsp:nvSpPr>
+      <dsp:spPr>
+        <a:xfrm>
+          <a:off x="3376795" y="4748441"/>
+          <a:ext cx="918056" cy="918056"/>
+        </a:xfrm>
+        <a:prstGeom prst="rect">
+          <a:avLst/>
+        </a:prstGeom>
+        <a:solidFill>
+          <a:schemeClr val="accent3">
+            <a:hueOff val="0"/>
+            <a:satOff val="0"/>
+            <a:lumOff val="0"/>
+            <a:alphaOff val="0"/>
+          </a:schemeClr>
+        </a:solidFill>
+        <a:ln w="12700" cap="flat" cmpd="sng" algn="ctr">
+          <a:noFill/>
+          <a:prstDash val="solid"/>
+          <a:miter lim="800000"/>
+        </a:ln>
+        <a:effectLst/>
+      </dsp:spPr>
+      <dsp:style>
+        <a:lnRef idx="2">
+          <a:scrgbClr r="0" g="0" b="0"/>
+        </a:lnRef>
+        <a:fillRef idx="1">
+          <a:scrgbClr r="0" g="0" b="0"/>
+        </a:fillRef>
+        <a:effectRef idx="0">
+          <a:scrgbClr r="0" g="0" b="0"/>
+        </a:effectRef>
+        <a:fontRef idx="minor">
+          <a:schemeClr val="lt1"/>
+        </a:fontRef>
+      </dsp:style>
+    </dsp:sp>
+    <dsp:sp modelId="{62C893C0-9CF6-4E31-B5A1-B6F7DB126B99}">
+      <dsp:nvSpPr>
+        <dsp:cNvPr id="0" name=""/>
+        <dsp:cNvSpPr/>
+      </dsp:nvSpPr>
+      <dsp:spPr>
+        <a:xfrm>
+          <a:off x="1927918" y="2087205"/>
+          <a:ext cx="5075858" cy="1669193"/>
+        </a:xfrm>
+        <a:prstGeom prst="rect">
+          <a:avLst/>
+        </a:prstGeom>
+        <a:noFill/>
+        <a:ln>
+          <a:noFill/>
+        </a:ln>
+        <a:effectLst/>
+      </dsp:spPr>
+      <dsp:style>
+        <a:lnRef idx="0">
+          <a:scrgbClr r="0" g="0" b="0"/>
+        </a:lnRef>
+        <a:fillRef idx="0">
+          <a:scrgbClr r="0" g="0" b="0"/>
+        </a:fillRef>
+        <a:effectRef idx="0">
+          <a:scrgbClr r="0" g="0" b="0"/>
+        </a:effectRef>
+        <a:fontRef idx="minor"/>
+      </dsp:style>
+      <dsp:txBody>
+        <a:bodyPr spcFirstLastPara="0" vert="horz" wrap="square" lIns="176656" tIns="176656" rIns="176656" bIns="176656" numCol="1" spcCol="1270" anchor="ctr" anchorCtr="0">
+          <a:noAutofit/>
+        </a:bodyPr>
+        <a:lstStyle/>
+        <a:p>
+          <a:pPr marL="0" lvl="0" indent="0" algn="l" defTabSz="755650">
+            <a:lnSpc>
+              <a:spcPct val="100000"/>
+            </a:lnSpc>
+            <a:spcBef>
+              <a:spcPct val="0"/>
+            </a:spcBef>
+            <a:spcAft>
+              <a:spcPct val="35000"/>
+            </a:spcAft>
+            <a:buNone/>
+          </a:pPr>
+          <a:r>
+            <a:rPr lang="pt-BR" sz="1700" kern="1200"/>
+            <a:t>O principal desafio é manter o vinho em processo de maturação em uma temperatura e umidade ideais para um bom envelhecimento;</a:t>
+          </a:r>
+          <a:endParaRPr lang="en-US" sz="1700" kern="1200"/>
+        </a:p>
+      </dsp:txBody>
+      <dsp:txXfrm>
+        <a:off x="1927918" y="2087205"/>
+        <a:ext cx="5075858" cy="1669193"/>
+      </dsp:txXfrm>
+    </dsp:sp>
+    <dsp:sp modelId="{4E411C41-F318-4C88-A7EC-C0217FC54FC3}">
+      <dsp:nvSpPr>
+        <dsp:cNvPr id="0" name=""/>
+        <dsp:cNvSpPr/>
+      </dsp:nvSpPr>
+      <dsp:spPr>
+        <a:xfrm>
+          <a:off x="0" y="4173697"/>
+          <a:ext cx="7003777" cy="1669193"/>
+        </a:xfrm>
+        <a:prstGeom prst="roundRect">
+          <a:avLst>
+            <a:gd name="adj" fmla="val 10000"/>
+          </a:avLst>
+        </a:prstGeom>
+        <a:solidFill>
+          <a:schemeClr val="bg1">
+            <a:lumMod val="95000"/>
+            <a:hueOff val="0"/>
+            <a:satOff val="0"/>
+            <a:lumOff val="0"/>
+            <a:alphaOff val="0"/>
+          </a:schemeClr>
+        </a:solidFill>
+        <a:ln>
+          <a:noFill/>
+        </a:ln>
+        <a:effectLst/>
+      </dsp:spPr>
+      <dsp:style>
+        <a:lnRef idx="0">
+          <a:scrgbClr r="0" g="0" b="0"/>
+        </a:lnRef>
+        <a:fillRef idx="1">
+          <a:scrgbClr r="0" g="0" b="0"/>
+        </a:fillRef>
+        <a:effectRef idx="0">
+          <a:scrgbClr r="0" g="0" b="0"/>
+        </a:effectRef>
+        <a:fontRef idx="minor"/>
+      </dsp:style>
+    </dsp:sp>
+    <dsp:sp modelId="{1D312433-7812-4562-B83E-331A635F9BBB}">
+      <dsp:nvSpPr>
+        <dsp:cNvPr id="0" name=""/>
+        <dsp:cNvSpPr/>
+      </dsp:nvSpPr>
+      <dsp:spPr>
+        <a:xfrm>
+          <a:off x="504931" y="4549266"/>
+          <a:ext cx="918056" cy="918056"/>
         </a:xfrm>
         <a:prstGeom prst="rect">
           <a:avLst/>
@@ -2827,15 +3069,15 @@
         </a:fontRef>
       </dsp:style>
     </dsp:sp>
-    <dsp:sp modelId="{D5A8AB6D-80AE-46D3-99C1-4E490037A6EA}">
+    <dsp:sp modelId="{BECCE7AB-2A47-4810-AFCD-9AA6F6444A9D}">
       <dsp:nvSpPr>
         <dsp:cNvPr id="0" name=""/>
         <dsp:cNvSpPr/>
       </dsp:nvSpPr>
       <dsp:spPr>
         <a:xfrm>
-          <a:off x="3813075" y="2281273"/>
-          <a:ext cx="2889450" cy="765000"/>
+          <a:off x="1927918" y="4173697"/>
+          <a:ext cx="5075858" cy="1669193"/>
         </a:xfrm>
         <a:prstGeom prst="rect">
           <a:avLst/>
@@ -2859,14 +3101,14 @@
         <a:fontRef idx="minor"/>
       </dsp:style>
       <dsp:txBody>
-        <a:bodyPr spcFirstLastPara="0" vert="horz" wrap="square" lIns="0" tIns="0" rIns="0" bIns="0" numCol="1" spcCol="1270" anchor="t" anchorCtr="0">
+        <a:bodyPr spcFirstLastPara="0" vert="horz" wrap="square" lIns="176656" tIns="176656" rIns="176656" bIns="176656" numCol="1" spcCol="1270" anchor="ctr" anchorCtr="0">
           <a:noAutofit/>
         </a:bodyPr>
         <a:lstStyle/>
         <a:p>
-          <a:pPr marL="0" lvl="0" indent="0" algn="ctr" defTabSz="488950">
+          <a:pPr marL="0" lvl="0" indent="0" algn="l" defTabSz="755650">
             <a:lnSpc>
-              <a:spcPct val="90000"/>
+              <a:spcPct val="100000"/>
             </a:lnSpc>
             <a:spcBef>
               <a:spcPct val="0"/>
@@ -2877,126 +3119,15 @@
             <a:buNone/>
           </a:pPr>
           <a:r>
-            <a:rPr lang="pt-BR" sz="1100" kern="1200" dirty="0"/>
-            <a:t>O principal desafio é manter o vinho em processo de maturação em uma temperatura e umidade ideais para um bom envelhecimento;</a:t>
+            <a:rPr lang="pt-BR" sz="1700" kern="1200"/>
+            <a:t>O problema esta justamente nesse controle de temperatura, pois uma alteração brusca na temperatura e umidade afeta na qualidade do vinho, podendo levar a perda total do seu produto.</a:t>
           </a:r>
-          <a:endParaRPr lang="en-US" sz="1100" kern="1200" dirty="0"/>
+          <a:endParaRPr lang="en-US" sz="1700" kern="1200"/>
         </a:p>
       </dsp:txBody>
       <dsp:txXfrm>
-        <a:off x="3813075" y="2281273"/>
-        <a:ext cx="2889450" cy="765000"/>
-      </dsp:txXfrm>
-    </dsp:sp>
-    <dsp:sp modelId="{8E72D609-285F-4084-9C88-2BDE423A2606}">
-      <dsp:nvSpPr>
-        <dsp:cNvPr id="0" name=""/>
-        <dsp:cNvSpPr/>
-      </dsp:nvSpPr>
-      <dsp:spPr>
-        <a:xfrm>
-          <a:off x="8002777" y="616089"/>
-          <a:ext cx="1300252" cy="1300252"/>
-        </a:xfrm>
-        <a:prstGeom prst="rect">
-          <a:avLst/>
-        </a:prstGeom>
-        <a:blipFill>
-          <a:blip xmlns:r="http://schemas.openxmlformats.org/officeDocument/2006/relationships" r:embed="rId5">
-            <a:extLst>
-              <a:ext uri="{28A0092B-C50C-407E-A947-70E740481C1C}">
-                <a14:useLocalDpi xmlns:a14="http://schemas.microsoft.com/office/drawing/2010/main" val="0"/>
-              </a:ext>
-              <a:ext uri="{96DAC541-7B7A-43D3-8B79-37D633B846F1}">
-                <asvg:svgBlip xmlns:asvg="http://schemas.microsoft.com/office/drawing/2016/SVG/main" r:embed="rId6"/>
-              </a:ext>
-            </a:extLst>
-          </a:blip>
-          <a:stretch>
-            <a:fillRect/>
-          </a:stretch>
-        </a:blipFill>
-        <a:ln w="12700" cap="flat" cmpd="sng" algn="ctr">
-          <a:noFill/>
-          <a:prstDash val="solid"/>
-          <a:miter lim="800000"/>
-        </a:ln>
-        <a:effectLst/>
-      </dsp:spPr>
-      <dsp:style>
-        <a:lnRef idx="2">
-          <a:scrgbClr r="0" g="0" b="0"/>
-        </a:lnRef>
-        <a:fillRef idx="1">
-          <a:scrgbClr r="0" g="0" b="0"/>
-        </a:fillRef>
-        <a:effectRef idx="0">
-          <a:scrgbClr r="0" g="0" b="0"/>
-        </a:effectRef>
-        <a:fontRef idx="minor">
-          <a:schemeClr val="lt1"/>
-        </a:fontRef>
-      </dsp:style>
-    </dsp:sp>
-    <dsp:sp modelId="{4FD25476-AB13-4C7F-8BEB-B818B15DB8EC}">
-      <dsp:nvSpPr>
-        <dsp:cNvPr id="0" name=""/>
-        <dsp:cNvSpPr/>
-      </dsp:nvSpPr>
-      <dsp:spPr>
-        <a:xfrm>
-          <a:off x="7208178" y="2281273"/>
-          <a:ext cx="2889450" cy="765000"/>
-        </a:xfrm>
-        <a:prstGeom prst="rect">
-          <a:avLst/>
-        </a:prstGeom>
-        <a:noFill/>
-        <a:ln>
-          <a:noFill/>
-        </a:ln>
-        <a:effectLst/>
-      </dsp:spPr>
-      <dsp:style>
-        <a:lnRef idx="0">
-          <a:scrgbClr r="0" g="0" b="0"/>
-        </a:lnRef>
-        <a:fillRef idx="0">
-          <a:scrgbClr r="0" g="0" b="0"/>
-        </a:fillRef>
-        <a:effectRef idx="0">
-          <a:scrgbClr r="0" g="0" b="0"/>
-        </a:effectRef>
-        <a:fontRef idx="minor"/>
-      </dsp:style>
-      <dsp:txBody>
-        <a:bodyPr spcFirstLastPara="0" vert="horz" wrap="square" lIns="0" tIns="0" rIns="0" bIns="0" numCol="1" spcCol="1270" anchor="t" anchorCtr="0">
-          <a:noAutofit/>
-        </a:bodyPr>
-        <a:lstStyle/>
-        <a:p>
-          <a:pPr marL="0" lvl="0" indent="0" algn="ctr" defTabSz="488950">
-            <a:lnSpc>
-              <a:spcPct val="90000"/>
-            </a:lnSpc>
-            <a:spcBef>
-              <a:spcPct val="0"/>
-            </a:spcBef>
-            <a:spcAft>
-              <a:spcPct val="35000"/>
-            </a:spcAft>
-            <a:buNone/>
-          </a:pPr>
-          <a:r>
-            <a:rPr lang="pt-BR" sz="1100" kern="1200"/>
-            <a:t>O problema esta justamente nesse controle de temperatura, pois uma alteração brusca na temperatura e umidade afeta na qualidade do vinho, podendo levar a perda total do seu produto.</a:t>
-          </a:r>
-          <a:endParaRPr lang="en-US" sz="1100" kern="1200"/>
-        </a:p>
-      </dsp:txBody>
-      <dsp:txXfrm>
-        <a:off x="7208178" y="2281273"/>
-        <a:ext cx="2889450" cy="765000"/>
+        <a:off x="1927918" y="4173697"/>
+        <a:ext cx="5075858" cy="1669193"/>
       </dsp:txXfrm>
     </dsp:sp>
   </dsp:spTree>
@@ -3776,9 +3907,9 @@
 </file>
 
 <file path=ppt/diagrams/layout1.xml><?xml version="1.0" encoding="utf-8"?>
-<dgm:layoutDef xmlns:dgm="http://schemas.openxmlformats.org/drawingml/2006/diagram" xmlns:a="http://schemas.openxmlformats.org/drawingml/2006/main" uniqueId="urn:microsoft.com/office/officeart/2018/2/layout/IconLabelList">
-  <dgm:title val="Icon Label List"/>
-  <dgm:desc val="Use to show non-sequential or grouped chunks of information accompanied by a related visuals. Works best with icons or small pictures with short text captions."/>
+<dgm:layoutDef xmlns:dgm="http://schemas.openxmlformats.org/drawingml/2006/diagram" xmlns:a="http://schemas.openxmlformats.org/drawingml/2006/main" uniqueId="urn:microsoft.com/office/officeart/2018/2/layout/IconVerticalSolidList">
+  <dgm:title val="Icon Vertical Solid List"/>
+  <dgm:desc val="Use to show a series of visuals from top to bottom with Level 1 or Level 1 and Level 2 text grouped in a shape. Works best with icons or small pictures with lengthier descriptions."/>
   <dgm:catLst>
     <dgm:cat type="icon" pri="500"/>
   </dgm:catLst>
@@ -3810,23 +3941,15 @@
     </dgm:varLst>
     <dgm:choose name="Name0">
       <dgm:if name="Name1" axis="self" func="var" arg="dir" op="equ" val="norm">
-        <dgm:alg type="snake">
-          <dgm:param type="grDir" val="tL"/>
-          <dgm:param type="flowDir" val="row"/>
-          <dgm:param type="contDir" val="sameDir"/>
-          <dgm:param type="off" val="ctr"/>
-          <dgm:param type="vertAlign" val="mid"/>
-          <dgm:param type="horzAlign" val="ctr"/>
+        <dgm:alg type="lin">
+          <dgm:param type="linDir" val="fromT"/>
+          <dgm:param type="nodeHorzAlign" val="l"/>
         </dgm:alg>
       </dgm:if>
       <dgm:else name="Name2">
-        <dgm:alg type="snake">
-          <dgm:param type="grDir" val="tR"/>
-          <dgm:param type="flowDir" val="row"/>
-          <dgm:param type="contDir" val="sameDir"/>
-          <dgm:param type="off" val="ctr"/>
-          <dgm:param type="vertAlign" val="mid"/>
-          <dgm:param type="horzAlign" val="ctr"/>
+        <dgm:alg type="lin">
+          <dgm:param type="linDir" val="fromT"/>
+          <dgm:param type="nodeHorzAlign" val="r"/>
         </dgm:alg>
       </dgm:else>
     </dgm:choose>
@@ -3835,67 +3958,139 @@
     </dgm:shape>
     <dgm:presOf/>
     <dgm:choose name="Name3">
-      <dgm:if name="Name4" axis="ch" ptType="node" func="cnt" op="lte" val="2">
+      <dgm:if name="Name4" axis="ch" ptType="node" func="cnt" op="lte" val="3">
         <dgm:constrLst>
-          <dgm:constr type="h" for="ch" forName="compNode" refType="h" fact="0.4"/>
-          <dgm:constr type="w" for="ch" forName="compNode" val="120"/>
-          <dgm:constr type="w" for="ch" forName="sibTrans" refType="w" refFor="ch" refForName="compNode" fact="0.175"/>
-          <dgm:constr type="sp" refType="w" refFor="ch" refForName="compNode" op="equ" fact="0.25"/>
-          <dgm:constr type="primFontSz" for="des" ptType="node" op="equ" val="50"/>
+          <dgm:constr type="h" for="ch" forName="compNode" refType="h" fact="0.3"/>
+          <dgm:constr type="w" for="ch" forName="compNode" refType="w"/>
+          <dgm:constr type="h" for="ch" forName="sibTrans" refType="h" refFor="ch" refForName="compNode" fact="0.25"/>
+          <dgm:constr type="primFontSz" for="des" forName="parTx" val="25"/>
+          <dgm:constr type="primFontSz" for="des" forName="desTx" refType="primFontSz" refFor="des" refForName="parTx" op="lte" fact="0.75"/>
           <dgm:constr type="h" for="des" forName="compNode" op="equ"/>
-          <dgm:constr type="h" for="des" forName="textRect" op="equ"/>
+          <dgm:constr type="h" for="des" forName="bgRect" op="equ"/>
+          <dgm:constr type="h" for="des" forName="iconRect" op="equ"/>
+          <dgm:constr type="w" for="des" forName="iconRect" op="equ"/>
+          <dgm:constr type="h" for="des" forName="spaceRect" op="equ"/>
+          <dgm:constr type="h" for="des" forName="parTx" op="equ"/>
+          <dgm:constr type="h" for="des" forName="desTx" op="equ"/>
         </dgm:constrLst>
       </dgm:if>
       <dgm:if name="Name5" axis="ch" ptType="node" func="cnt" op="lte" val="4">
         <dgm:constrLst>
-          <dgm:constr type="h" for="ch" forName="compNode" refType="h" fact="0.4"/>
+          <dgm:constr type="h" for="ch" forName="compNode" refType="h" fact="0.3"/>
           <dgm:constr type="w" for="ch" forName="compNode" refType="w"/>
-          <dgm:constr type="w" for="ch" forName="sibTrans" refType="w" refFor="ch" refForName="compNode" fact="0.175"/>
-          <dgm:constr type="sp" refType="w" refFor="ch" refForName="compNode" op="equ" fact="0.25"/>
-          <dgm:constr type="primFontSz" for="des" ptType="node" op="equ" val="36"/>
+          <dgm:constr type="h" for="ch" forName="sibTrans" refType="h" refFor="ch" refForName="compNode" fact="0.25"/>
+          <dgm:constr type="primFontSz" for="des" forName="parTx" val="22"/>
+          <dgm:constr type="primFontSz" for="des" forName="desTx" refType="primFontSz" refFor="des" refForName="parTx" op="lte" fact="0.75"/>
           <dgm:constr type="h" for="des" forName="compNode" op="equ"/>
-          <dgm:constr type="h" for="des" forName="textRect" op="equ"/>
+          <dgm:constr type="h" for="des" forName="bgRect" op="equ"/>
+          <dgm:constr type="h" for="des" forName="iconRect" op="equ"/>
+          <dgm:constr type="w" for="des" forName="iconRect" op="equ"/>
+          <dgm:constr type="h" for="des" forName="spaceRect" op="equ"/>
+          <dgm:constr type="h" for="des" forName="parTx" op="equ"/>
+          <dgm:constr type="h" for="des" forName="desTx" op="equ"/>
         </dgm:constrLst>
       </dgm:if>
-      <dgm:else name="Name6">
+      <dgm:if name="Name6" axis="ch" ptType="node" func="cnt" op="lte" val="6">
         <dgm:constrLst>
-          <dgm:constr type="h" for="ch" forName="compNode" refType="h" fact="0.4"/>
+          <dgm:constr type="h" for="ch" forName="compNode" refType="h" fact="0.3"/>
           <dgm:constr type="w" for="ch" forName="compNode" refType="w"/>
-          <dgm:constr type="w" for="ch" forName="sibTrans" refType="w" refFor="ch" refForName="compNode" fact="0.175"/>
-          <dgm:constr type="sp" refType="w" refFor="ch" refForName="compNode" op="equ" fact="0.25"/>
-          <dgm:constr type="primFontSz" for="des" ptType="node" op="equ" val="24"/>
+          <dgm:constr type="h" for="ch" forName="sibTrans" refType="h" refFor="ch" refForName="compNode" fact="0.25"/>
+          <dgm:constr type="primFontSz" for="des" forName="parTx" val="19"/>
+          <dgm:constr type="primFontSz" for="des" forName="desTx" refType="primFontSz" refFor="des" refForName="parTx" op="lte" fact="0.75"/>
           <dgm:constr type="h" for="des" forName="compNode" op="equ"/>
-          <dgm:constr type="h" for="des" forName="textRect" op="equ"/>
+          <dgm:constr type="h" for="des" forName="bgRect" op="equ"/>
+          <dgm:constr type="h" for="des" forName="iconRect" op="equ"/>
+          <dgm:constr type="w" for="des" forName="iconRect" op="equ"/>
+          <dgm:constr type="h" for="des" forName="spaceRect" op="equ"/>
+          <dgm:constr type="h" for="des" forName="parTx" op="equ"/>
+          <dgm:constr type="h" for="des" forName="desTx" op="equ"/>
+        </dgm:constrLst>
+      </dgm:if>
+      <dgm:else name="Name7">
+        <dgm:constrLst>
+          <dgm:constr type="h" for="ch" forName="compNode" refType="h" fact="0.3"/>
+          <dgm:constr type="w" for="ch" forName="compNode" refType="w"/>
+          <dgm:constr type="h" for="ch" forName="sibTrans" refType="h" refFor="ch" refForName="compNode" fact="0.25"/>
+          <dgm:constr type="primFontSz" for="des" forName="parTx" val="16"/>
+          <dgm:constr type="primFontSz" for="des" forName="desTx" refType="primFontSz" refFor="des" refForName="parTx" op="lte" fact="0.75"/>
+          <dgm:constr type="h" for="des" forName="compNode" op="equ"/>
+          <dgm:constr type="h" for="des" forName="bgRect" op="equ"/>
+          <dgm:constr type="h" for="des" forName="iconRect" op="equ"/>
+          <dgm:constr type="w" for="des" forName="iconRect" op="equ"/>
+          <dgm:constr type="h" for="des" forName="spaceRect" op="equ"/>
+          <dgm:constr type="h" for="des" forName="parTx" op="equ"/>
+          <dgm:constr type="h" for="des" forName="desTx" op="equ"/>
         </dgm:constrLst>
       </dgm:else>
     </dgm:choose>
     <dgm:ruleLst>
-      <dgm:rule type="w" for="ch" forName="compNode" val="50" fact="NaN" max="NaN"/>
+      <dgm:rule type="h" for="ch" forName="compNode" val="0" fact="NaN" max="NaN"/>
     </dgm:ruleLst>
-    <dgm:forEach name="Name7" axis="ch" ptType="node">
+    <dgm:forEach name="Name8" axis="ch" ptType="node">
       <dgm:layoutNode name="compNode">
         <dgm:alg type="composite"/>
         <dgm:shape xmlns:r="http://schemas.openxmlformats.org/officeDocument/2006/relationships" r:blip="">
           <dgm:adjLst/>
         </dgm:shape>
         <dgm:presOf axis="self"/>
-        <dgm:constrLst>
-          <dgm:constr type="w" for="ch" forName="iconRect" refType="w" fact="0.45"/>
-          <dgm:constr type="h" for="ch" forName="iconRect" refType="w" refFor="ch" refForName="iconRect"/>
-          <dgm:constr type="ctrX" for="ch" forName="iconRect" refType="w" fact="0.5"/>
-          <dgm:constr type="t" for="ch" forName="iconRect"/>
-          <dgm:constr type="h" for="ch" forName="spaceRect" refType="h" fact="0.15"/>
-          <dgm:constr type="w" for="ch" forName="spaceRect" refType="w"/>
-          <dgm:constr type="l" for="ch" forName="spaceRect"/>
-          <dgm:constr type="t" for="ch" forName="spaceRect" refType="b" refFor="ch" refForName="iconRect"/>
-          <dgm:constr type="h" for="ch" forName="textRect" val="20"/>
-          <dgm:constr type="w" for="ch" forName="textRect" refType="w"/>
-          <dgm:constr type="l" for="ch" forName="textRect"/>
-          <dgm:constr type="t" for="ch" forName="textRect" refType="b" refFor="ch" refForName="spaceRect"/>
-        </dgm:constrLst>
+        <dgm:choose name="Name9">
+          <dgm:if name="Name10" axis="ch" ptType="node" func="cnt" op="gte" val="1">
+            <dgm:constrLst>
+              <dgm:constr type="w" for="ch" forName="bgRect" refType="w"/>
+              <dgm:constr type="h" for="ch" forName="bgRect" refType="h"/>
+              <dgm:constr type="l" for="ch" forName="bgRect"/>
+              <dgm:constr type="t" for="ch" forName="bgRect"/>
+              <dgm:constr type="h" for="ch" forName="iconRect" refType="h" fact="0.55"/>
+              <dgm:constr type="w" for="ch" forName="iconRect" refType="h" refFor="ch" refForName="iconRect"/>
+              <dgm:constr type="l" for="ch" forName="iconRect" refType="h" refFor="ch" refForName="iconRect" fact="0.55"/>
+              <dgm:constr type="ctrY" for="ch" forName="iconRect" refType="ctrY" refFor="ch" refForName="bgRect"/>
+              <dgm:constr type="w" for="ch" forName="spaceRect" refType="l" refFor="ch" refForName="iconRect"/>
+              <dgm:constr type="h" for="ch" forName="spaceRect" refType="h"/>
+              <dgm:constr type="l" for="ch" forName="spaceRect" refType="r" refFor="ch" refForName="iconRect"/>
+              <dgm:constr type="t" for="ch" forName="spaceRect"/>
+              <dgm:constr type="w" for="ch" forName="parTx" refType="w" fact="0.45"/>
+              <dgm:constr type="h" for="ch" forName="parTx" refType="h"/>
+              <dgm:constr type="l" for="ch" forName="parTx" refType="r" refFor="ch" refForName="spaceRect"/>
+              <dgm:constr type="t" for="ch" forName="parTx"/>
+              <dgm:constr type="h" for="ch" forName="desTx" refType="h"/>
+              <dgm:constr type="l" for="ch" forName="desTx" refType="r" refFor="ch" refForName="parTx"/>
+              <dgm:constr type="t" for="ch" forName="desTx"/>
+            </dgm:constrLst>
+          </dgm:if>
+          <dgm:else name="Name11">
+            <dgm:constrLst>
+              <dgm:constr type="w" for="ch" forName="bgRect" refType="w"/>
+              <dgm:constr type="h" for="ch" forName="bgRect" refType="h"/>
+              <dgm:constr type="l" for="ch" forName="bgRect"/>
+              <dgm:constr type="t" for="ch" forName="bgRect"/>
+              <dgm:constr type="h" for="ch" forName="iconRect" refType="h" fact="0.55"/>
+              <dgm:constr type="w" for="ch" forName="iconRect" refType="h" refFor="ch" refForName="iconRect"/>
+              <dgm:constr type="l" for="ch" forName="iconRect" refType="h" refFor="ch" refForName="iconRect" fact="0.55"/>
+              <dgm:constr type="ctrY" for="ch" forName="iconRect" refType="ctrY" refFor="ch" refForName="bgRect"/>
+              <dgm:constr type="w" for="ch" forName="spaceRect" refType="l" refFor="ch" refForName="iconRect"/>
+              <dgm:constr type="h" for="ch" forName="spaceRect" refType="h"/>
+              <dgm:constr type="l" for="ch" forName="spaceRect" refType="r" refFor="ch" refForName="iconRect"/>
+              <dgm:constr type="t" for="ch" forName="spaceRect"/>
+              <dgm:constr type="h" for="ch" forName="parTx" refType="h"/>
+              <dgm:constr type="l" for="ch" forName="parTx" refType="r" refFor="ch" refForName="spaceRect"/>
+              <dgm:constr type="t" for="ch" forName="parTx"/>
+            </dgm:constrLst>
+          </dgm:else>
+        </dgm:choose>
         <dgm:ruleLst>
           <dgm:rule type="h" val="INF" fact="NaN" max="NaN"/>
         </dgm:ruleLst>
+        <dgm:layoutNode name="bgRect" styleLbl="bgShp">
+          <dgm:alg type="sp"/>
+          <dgm:shape xmlns:r="http://schemas.openxmlformats.org/officeDocument/2006/relationships" type="roundRect" r:blip="">
+            <dgm:adjLst>
+              <dgm:adj idx="1" val="0.1"/>
+            </dgm:adjLst>
+          </dgm:shape>
+          <dgm:presOf/>
+          <dgm:constrLst/>
+          <dgm:ruleLst/>
+        </dgm:layoutNode>
         <dgm:layoutNode name="iconRect" styleLbl="node1">
           <dgm:alg type="sp"/>
           <dgm:shape xmlns:r="http://schemas.openxmlformats.org/officeDocument/2006/relationships" type="rect" r:blip="" blipPhldr="1">
@@ -3914,31 +4109,66 @@
           <dgm:constrLst/>
           <dgm:ruleLst/>
         </dgm:layoutNode>
-        <dgm:layoutNode name="textRect" styleLbl="revTx">
+        <dgm:layoutNode name="parTx" styleLbl="revTx">
           <dgm:varLst>
-            <dgm:chMax val="1"/>
-            <dgm:chPref val="1"/>
+            <dgm:chMax val="0"/>
+            <dgm:chPref val="0"/>
           </dgm:varLst>
           <dgm:alg type="tx">
-            <dgm:param type="txAnchorVert" val="t"/>
+            <dgm:param type="txAnchorVert" val="mid"/>
+            <dgm:param type="parTxLTRAlign" val="l"/>
+            <dgm:param type="shpTxLTRAlignCh" val="l"/>
+            <dgm:param type="parTxRTLAlign" val="r"/>
+            <dgm:param type="shpTxRTLAlignCh" val="r"/>
           </dgm:alg>
           <dgm:shape xmlns:r="http://schemas.openxmlformats.org/officeDocument/2006/relationships" type="rect" r:blip="">
             <dgm:adjLst/>
           </dgm:shape>
           <dgm:presOf axis="self" ptType="node"/>
           <dgm:constrLst>
-            <dgm:constr type="lMarg"/>
-            <dgm:constr type="rMarg"/>
-            <dgm:constr type="tMarg"/>
-            <dgm:constr type="bMarg"/>
+            <dgm:constr type="lMarg" refType="h" fact="0.3"/>
+            <dgm:constr type="rMarg" refType="h" fact="0.3"/>
+            <dgm:constr type="tMarg" refType="h" fact="0.3"/>
+            <dgm:constr type="bMarg" refType="h" fact="0.3"/>
           </dgm:constrLst>
           <dgm:ruleLst>
-            <dgm:rule type="primFontSz" val="11" fact="NaN" max="NaN"/>
+            <dgm:rule type="primFontSz" val="14" fact="NaN" max="NaN"/>
             <dgm:rule type="h" val="INF" fact="NaN" max="NaN"/>
           </dgm:ruleLst>
         </dgm:layoutNode>
+        <dgm:choose name="Name12">
+          <dgm:if name="Name13" axis="ch" ptType="node" func="cnt" op="gte" val="1">
+            <dgm:layoutNode name="desTx" styleLbl="revTx">
+              <dgm:varLst/>
+              <dgm:alg type="tx">
+                <dgm:param type="txAnchorVertCh" val="mid"/>
+                <dgm:param type="parTxLTRAlign" val="l"/>
+                <dgm:param type="shpTxLTRAlignCh" val="l"/>
+                <dgm:param type="parTxRTLAlign" val="r"/>
+                <dgm:param type="shpTxRTLAlignCh" val="r"/>
+                <dgm:param type="stBulletLvl" val="0"/>
+              </dgm:alg>
+              <dgm:shape xmlns:r="http://schemas.openxmlformats.org/officeDocument/2006/relationships" type="rect" r:blip="">
+                <dgm:adjLst/>
+              </dgm:shape>
+              <dgm:presOf axis="des" ptType="node"/>
+              <dgm:constrLst>
+                <dgm:constr type="primFontSz" val="18"/>
+                <dgm:constr type="secFontSz" refType="primFontSz"/>
+                <dgm:constr type="lMarg" refType="h" fact="0.3"/>
+                <dgm:constr type="rMarg" refType="h" fact="0.3"/>
+                <dgm:constr type="tMarg" refType="h" fact="0.3"/>
+                <dgm:constr type="bMarg" refType="h" fact="0.3"/>
+              </dgm:constrLst>
+              <dgm:ruleLst>
+                <dgm:rule type="primFontSz" val="11" fact="NaN" max="NaN"/>
+              </dgm:ruleLst>
+            </dgm:layoutNode>
+          </dgm:if>
+          <dgm:else name="Name14"/>
+        </dgm:choose>
       </dgm:layoutNode>
-      <dgm:forEach name="Name8" axis="followSib" ptType="sibTrans" cnt="1">
+      <dgm:forEach name="Name15" axis="followSib" ptType="sibTrans" cnt="1">
         <dgm:layoutNode name="sibTrans">
           <dgm:alg type="sp"/>
           <dgm:shape xmlns:r="http://schemas.openxmlformats.org/officeDocument/2006/relationships" r:blip="">
@@ -3959,6 +4189,11 @@
             <a:spcPct val="100000"/>
           </a:lnSpc>
         </a:lvl1pPr>
+        <a:lvl2pPr>
+          <a:lnSpc>
+            <a:spcPct val="100000"/>
+          </a:lnSpc>
+        </a:lvl2pPr>
       </dgm1612:lstStyle>
     </a:ext>
   </dgm:extLst>
@@ -6490,7 +6725,7 @@
             <a:fld id="{11A6662E-FAF4-44BC-88B5-85A7CBFB6D30}" type="datetime1">
               <a:rPr lang="en-US" smtClean="0"/>
               <a:pPr/>
-              <a:t>9/4/2022</a:t>
+              <a:t>9/5/2022</a:t>
             </a:fld>
             <a:endParaRPr lang="en-US" dirty="0"/>
           </a:p>
@@ -6717,7 +6952,7 @@
           <a:p>
             <a:fld id="{4C559632-1575-4E14-B53B-3DC3D5ED3947}" type="datetime1">
               <a:rPr lang="en-US" smtClean="0"/>
-              <a:t>9/4/2022</a:t>
+              <a:t>9/5/2022</a:t>
             </a:fld>
             <a:endParaRPr lang="en-US"/>
           </a:p>
@@ -6925,7 +7160,7 @@
           <a:p>
             <a:fld id="{CC4A6868-2568-4CC9-B302-F37117B01A6E}" type="datetime1">
               <a:rPr lang="en-US" smtClean="0"/>
-              <a:t>9/4/2022</a:t>
+              <a:t>9/5/2022</a:t>
             </a:fld>
             <a:endParaRPr lang="en-US"/>
           </a:p>
@@ -7130,7 +7365,7 @@
           <a:p>
             <a:fld id="{0055F08A-1E71-4B2B-BB49-E743F2903911}" type="datetime1">
               <a:rPr lang="en-US" smtClean="0"/>
-              <a:t>9/4/2022</a:t>
+              <a:t>9/5/2022</a:t>
             </a:fld>
             <a:endParaRPr lang="en-US" dirty="0"/>
           </a:p>
@@ -7404,7 +7639,7 @@
           <a:p>
             <a:fld id="{15417D9E-721A-44BB-8863-9873FE64DA75}" type="datetime1">
               <a:rPr lang="en-US" smtClean="0"/>
-              <a:t>9/4/2022</a:t>
+              <a:t>9/5/2022</a:t>
             </a:fld>
             <a:endParaRPr lang="en-US"/>
           </a:p>
@@ -7677,7 +7912,7 @@
           <a:p>
             <a:fld id="{5F31DA2F-80B8-49CF-99FB-5ABCA53A607A}" type="datetime1">
               <a:rPr lang="en-US" smtClean="0"/>
-              <a:t>9/4/2022</a:t>
+              <a:t>9/5/2022</a:t>
             </a:fld>
             <a:endParaRPr lang="en-US"/>
           </a:p>
@@ -8092,7 +8327,7 @@
           <a:p>
             <a:fld id="{28852172-E6C9-4B6C-929A-A9DE3837BBF1}" type="datetime1">
               <a:rPr lang="en-US" smtClean="0"/>
-              <a:t>9/4/2022</a:t>
+              <a:t>9/5/2022</a:t>
             </a:fld>
             <a:endParaRPr lang="en-US"/>
           </a:p>
@@ -8244,7 +8479,7 @@
           <a:p>
             <a:fld id="{3AB41CFF-90C9-47B3-9DA1-F2BF8D839F7E}" type="datetime1">
               <a:rPr lang="en-US" smtClean="0"/>
-              <a:t>9/4/2022</a:t>
+              <a:t>9/5/2022</a:t>
             </a:fld>
             <a:endParaRPr lang="en-US"/>
           </a:p>
@@ -8357,7 +8592,7 @@
           <a:p>
             <a:fld id="{F06048FA-06AB-4884-A69B-986B96E68A24}" type="datetime1">
               <a:rPr lang="en-US" smtClean="0"/>
-              <a:t>9/4/2022</a:t>
+              <a:t>9/5/2022</a:t>
             </a:fld>
             <a:endParaRPr lang="en-US"/>
           </a:p>
@@ -8668,7 +8903,7 @@
           <a:p>
             <a:fld id="{50DB7ABA-0172-4F9C-889D-567164F66BCD}" type="datetime1">
               <a:rPr lang="en-US" smtClean="0"/>
-              <a:t>9/4/2022</a:t>
+              <a:t>9/5/2022</a:t>
             </a:fld>
             <a:endParaRPr lang="en-US"/>
           </a:p>
@@ -8959,7 +9194,7 @@
           <a:p>
             <a:fld id="{78AC6A5B-8AE7-4A41-B5A7-9ADC6686DC18}" type="datetime1">
               <a:rPr lang="en-US" smtClean="0"/>
-              <a:t>9/4/2022</a:t>
+              <a:t>9/5/2022</a:t>
             </a:fld>
             <a:endParaRPr lang="en-US"/>
           </a:p>
@@ -9268,7 +9503,7 @@
             <a:fld id="{57E0CF6C-748E-4B7A-BC8B-3011EF78ED13}" type="datetime1">
               <a:rPr lang="en-US" smtClean="0"/>
               <a:pPr/>
-              <a:t>9/4/2022</a:t>
+              <a:t>9/5/2022</a:t>
             </a:fld>
             <a:endParaRPr lang="en-US" dirty="0"/>
           </a:p>
@@ -10243,7 +10478,109 @@
 </p:sld>
 </file>
 
-<file path=ppt/slides/slide2.xml><?xml version="1.0" encoding="utf-8"?>
+<file path=ppt/slides/slide10.xml><?xml version="1.0" encoding="utf-8"?>
+<p:sld xmlns:a="http://schemas.openxmlformats.org/drawingml/2006/main" xmlns:r="http://schemas.openxmlformats.org/officeDocument/2006/relationships" xmlns:p="http://schemas.openxmlformats.org/presentationml/2006/main">
+  <p:cSld>
+    <p:spTree>
+      <p:nvGrpSpPr>
+        <p:cNvPr id="1" name=""/>
+        <p:cNvGrpSpPr/>
+        <p:nvPr/>
+      </p:nvGrpSpPr>
+      <p:grpSpPr>
+        <a:xfrm>
+          <a:off x="0" y="0"/>
+          <a:ext cx="0" cy="0"/>
+          <a:chOff x="0" y="0"/>
+          <a:chExt cx="0" cy="0"/>
+        </a:xfrm>
+      </p:grpSpPr>
+      <p:sp>
+        <p:nvSpPr>
+          <p:cNvPr id="2" name="Título 1">
+            <a:extLst>
+              <a:ext uri="{FF2B5EF4-FFF2-40B4-BE49-F238E27FC236}">
+                <a16:creationId xmlns:a16="http://schemas.microsoft.com/office/drawing/2014/main" id="{B17519EF-A114-4BD6-5025-025A8FA232D2}"/>
+              </a:ext>
+            </a:extLst>
+          </p:cNvPr>
+          <p:cNvSpPr>
+            <a:spLocks noGrp="1"/>
+          </p:cNvSpPr>
+          <p:nvPr>
+            <p:ph type="title"/>
+          </p:nvPr>
+        </p:nvSpPr>
+        <p:spPr>
+          <a:xfrm>
+            <a:off x="3207026" y="316064"/>
+            <a:ext cx="5777948" cy="1325563"/>
+          </a:xfrm>
+        </p:spPr>
+        <p:txBody>
+          <a:bodyPr/>
+          <a:lstStyle/>
+          <a:p>
+            <a:pPr algn="ctr"/>
+            <a:r>
+              <a:rPr lang="pt-BR" dirty="0"/>
+              <a:t>Demonstração Arduino</a:t>
+            </a:r>
+          </a:p>
+        </p:txBody>
+      </p:sp>
+      <p:pic>
+        <p:nvPicPr>
+          <p:cNvPr id="5" name="Espaço Reservado para Conteúdo 4" descr="Logotipo&#10;&#10;Descrição gerada automaticamente">
+            <a:extLst>
+              <a:ext uri="{FF2B5EF4-FFF2-40B4-BE49-F238E27FC236}">
+                <a16:creationId xmlns:a16="http://schemas.microsoft.com/office/drawing/2014/main" id="{5CFAF68B-7F07-0644-8FD3-222CB073CA35}"/>
+              </a:ext>
+            </a:extLst>
+          </p:cNvPr>
+          <p:cNvPicPr>
+            <a:picLocks noGrp="1" noChangeAspect="1"/>
+          </p:cNvPicPr>
+          <p:nvPr>
+            <p:ph idx="1"/>
+          </p:nvPr>
+        </p:nvPicPr>
+        <p:blipFill>
+          <a:blip r:embed="rId2">
+            <a:extLst>
+              <a:ext uri="{28A0092B-C50C-407E-A947-70E740481C1C}">
+                <a14:useLocalDpi xmlns:a14="http://schemas.microsoft.com/office/drawing/2010/main" val="0"/>
+              </a:ext>
+            </a:extLst>
+          </a:blip>
+          <a:stretch>
+            <a:fillRect/>
+          </a:stretch>
+        </p:blipFill>
+        <p:spPr>
+          <a:xfrm>
+            <a:off x="3644666" y="2343514"/>
+            <a:ext cx="4902667" cy="3325409"/>
+          </a:xfrm>
+        </p:spPr>
+      </p:pic>
+    </p:spTree>
+    <p:extLst>
+      <p:ext uri="{BB962C8B-B14F-4D97-AF65-F5344CB8AC3E}">
+        <p14:creationId xmlns:p14="http://schemas.microsoft.com/office/powerpoint/2010/main" val="2447561628"/>
+      </p:ext>
+    </p:extLst>
+  </p:cSld>
+  <p:clrMapOvr>
+    <a:masterClrMapping/>
+  </p:clrMapOvr>
+  <p:transition spd="med">
+    <p:pull/>
+  </p:transition>
+</p:sld>
+</file>
+
+<file path=ppt/slides/slide11.xml><?xml version="1.0" encoding="utf-8"?>
 <p:sld xmlns:a="http://schemas.openxmlformats.org/drawingml/2006/main" xmlns:r="http://schemas.openxmlformats.org/officeDocument/2006/relationships" xmlns:p="http://schemas.openxmlformats.org/presentationml/2006/main">
   <p:cSld>
     <p:bg>
@@ -10270,7 +10607,7 @@
       </p:grpSpPr>
       <p:sp useBgFill="1">
         <p:nvSpPr>
-          <p:cNvPr id="8" name="Rectangle 7">
+          <p:cNvPr id="29" name="Rectangle 28">
             <a:extLst>
               <a:ext uri="{FF2B5EF4-FFF2-40B4-BE49-F238E27FC236}">
                 <a16:creationId xmlns:a16="http://schemas.microsoft.com/office/drawing/2014/main" id="{8651CFA9-6065-4243-AC48-858E359780B1}"/>
@@ -10293,7 +10630,7 @@
         </p:nvSpPr>
         <p:spPr>
           <a:xfrm>
-            <a:off x="0" y="0"/>
+            <a:off x="3048" y="0"/>
             <a:ext cx="12188952" cy="6858000"/>
           </a:xfrm>
           <a:prstGeom prst="rect">
@@ -10324,7 +10661,7 @@
           <a:lstStyle/>
           <a:p>
             <a:pPr algn="ctr"/>
-            <a:endParaRPr lang="en-US" dirty="0">
+            <a:endParaRPr lang="en-US">
               <a:solidFill>
                 <a:schemeClr val="tx1">
                   <a:lumMod val="65000"/>
@@ -10338,10 +10675,10 @@
       </p:sp>
       <p:sp>
         <p:nvSpPr>
-          <p:cNvPr id="10" name="Rectangle 9">
+          <p:cNvPr id="31" name="Rectangle 30">
             <a:extLst>
               <a:ext uri="{FF2B5EF4-FFF2-40B4-BE49-F238E27FC236}">
-                <a16:creationId xmlns:a16="http://schemas.microsoft.com/office/drawing/2014/main" id="{F8B048C4-AB77-4182-B261-2C9BE59621FF}"/>
+                <a16:creationId xmlns:a16="http://schemas.microsoft.com/office/drawing/2014/main" id="{37962AE0-6A1C-4B76-9D52-10E5E6D7D3BB}"/>
               </a:ext>
               <a:ext uri="{C183D7F6-B498-43B3-948B-1728B52AA6E4}">
                 <adec:decorative xmlns:adec="http://schemas.microsoft.com/office/drawing/2017/decorative" val="1"/>
@@ -10412,10 +10749,10 @@
       </p:sp>
       <p:grpSp>
         <p:nvGrpSpPr>
-          <p:cNvPr id="12" name="Group 11">
+          <p:cNvPr id="33" name="Group 32">
             <a:extLst>
               <a:ext uri="{FF2B5EF4-FFF2-40B4-BE49-F238E27FC236}">
-                <a16:creationId xmlns:a16="http://schemas.microsoft.com/office/drawing/2014/main" id="{A700D801-79CB-4F23-8DF8-6B0F45FCD11B}"/>
+                <a16:creationId xmlns:a16="http://schemas.microsoft.com/office/drawing/2014/main" id="{191D96BF-0605-446D-9590-F9A64BF8E7F9}"/>
               </a:ext>
               <a:ext uri="{C183D7F6-B498-43B3-948B-1728B52AA6E4}">
                 <adec:decorative xmlns:adec="http://schemas.microsoft.com/office/drawing/2017/decorative" val="1"/>
@@ -10434,8 +10771,8 @@
           </p:nvPr>
         </p:nvGrpSpPr>
         <p:grpSpPr>
-          <a:xfrm flipH="1" flipV="1">
-            <a:off x="6955029" y="1"/>
+          <a:xfrm flipV="1">
+            <a:off x="3048" y="1"/>
             <a:ext cx="5236971" cy="6858000"/>
             <a:chOff x="20829" y="1"/>
             <a:chExt cx="5236971" cy="6857999"/>
@@ -10443,10 +10780,10 @@
         </p:grpSpPr>
         <p:pic>
           <p:nvPicPr>
-            <p:cNvPr id="13" name="Picture 12">
+            <p:cNvPr id="34" name="Picture 33">
               <a:extLst>
                 <a:ext uri="{FF2B5EF4-FFF2-40B4-BE49-F238E27FC236}">
-                  <a16:creationId xmlns:a16="http://schemas.microsoft.com/office/drawing/2014/main" id="{AA52F426-0370-4291-8DA2-6F1DB66EAFA9}"/>
+                  <a16:creationId xmlns:a16="http://schemas.microsoft.com/office/drawing/2014/main" id="{B79C2449-D531-4936-82F1-C560A12818D9}"/>
                 </a:ext>
                 <a:ext uri="{C183D7F6-B498-43B3-948B-1728B52AA6E4}">
                   <adec:decorative xmlns:adec="http://schemas.microsoft.com/office/drawing/2017/decorative" val="1"/>
@@ -10496,10 +10833,10 @@
         </p:pic>
         <p:pic>
           <p:nvPicPr>
-            <p:cNvPr id="24" name="Picture 13">
+            <p:cNvPr id="35" name="Picture 34">
               <a:extLst>
                 <a:ext uri="{FF2B5EF4-FFF2-40B4-BE49-F238E27FC236}">
-                  <a16:creationId xmlns:a16="http://schemas.microsoft.com/office/drawing/2014/main" id="{987AEA36-C28D-4764-988B-6C2AC65033F1}"/>
+                  <a16:creationId xmlns:a16="http://schemas.microsoft.com/office/drawing/2014/main" id="{E881F028-6F1E-42D8-B367-94F963C44CF3}"/>
                 </a:ext>
                 <a:ext uri="{C183D7F6-B498-43B3-948B-1728B52AA6E4}">
                   <adec:decorative xmlns:adec="http://schemas.microsoft.com/office/drawing/2017/decorative" val="1"/>
@@ -10526,7 +10863,7 @@
                 </a:schemeClr>
                 <a:prstClr val="white"/>
               </a:duotone>
-              <a:alphaModFix amt="5000"/>
+              <a:alphaModFix amt="10000"/>
               <a:extLst>
                 <a:ext uri="{28A0092B-C50C-407E-A947-70E740481C1C}">
                   <a14:useLocalDpi xmlns:a14="http://schemas.microsoft.com/office/drawing/2010/main" val="0"/>
@@ -10547,20 +10884,89 @@
           </p:spPr>
         </p:pic>
       </p:grpSp>
+      <p:sp>
+        <p:nvSpPr>
+          <p:cNvPr id="2" name="Título 1">
+            <a:extLst>
+              <a:ext uri="{FF2B5EF4-FFF2-40B4-BE49-F238E27FC236}">
+                <a16:creationId xmlns:a16="http://schemas.microsoft.com/office/drawing/2014/main" id="{2A3C7BB3-0A8C-6A6F-432D-E972702F9EAB}"/>
+              </a:ext>
+            </a:extLst>
+          </p:cNvPr>
+          <p:cNvSpPr>
+            <a:spLocks noGrp="1"/>
+          </p:cNvSpPr>
+          <p:nvPr>
+            <p:ph type="title"/>
+          </p:nvPr>
+        </p:nvSpPr>
+        <p:spPr>
+          <a:xfrm>
+            <a:off x="838201" y="559813"/>
+            <a:ext cx="4876800" cy="5577934"/>
+          </a:xfrm>
+        </p:spPr>
+        <p:txBody>
+          <a:bodyPr>
+            <a:normAutofit/>
+          </a:bodyPr>
+          <a:lstStyle/>
+          <a:p>
+            <a:r>
+              <a:rPr lang="pt-BR"/>
+              <a:t>Próximos passos</a:t>
+            </a:r>
+          </a:p>
+        </p:txBody>
+      </p:sp>
+      <p:graphicFrame>
+        <p:nvGraphicFramePr>
+          <p:cNvPr id="5" name="Espaço Reservado para Conteúdo 2">
+            <a:extLst>
+              <a:ext uri="{FF2B5EF4-FFF2-40B4-BE49-F238E27FC236}">
+                <a16:creationId xmlns:a16="http://schemas.microsoft.com/office/drawing/2014/main" id="{A3344D0C-99F1-1570-01F1-D929C9C31B58}"/>
+              </a:ext>
+            </a:extLst>
+          </p:cNvPr>
+          <p:cNvGraphicFramePr>
+            <a:graphicFrameLocks noGrp="1"/>
+          </p:cNvGraphicFramePr>
+          <p:nvPr>
+            <p:ph idx="1"/>
+            <p:extLst>
+              <p:ext uri="{D42A27DB-BD31-4B8C-83A1-F6EECF244321}">
+                <p14:modId xmlns:p14="http://schemas.microsoft.com/office/powerpoint/2010/main" val="1454695392"/>
+              </p:ext>
+            </p:extLst>
+          </p:nvPr>
+        </p:nvGraphicFramePr>
+        <p:xfrm>
+          <a:off x="6184458" y="343433"/>
+          <a:ext cx="5626542" cy="5785658"/>
+        </p:xfrm>
+        <a:graphic>
+          <a:graphicData uri="http://schemas.openxmlformats.org/drawingml/2006/diagram">
+            <dgm:relIds xmlns:dgm="http://schemas.openxmlformats.org/drawingml/2006/diagram" xmlns:r="http://schemas.openxmlformats.org/officeDocument/2006/relationships" r:dm="rId3" r:lo="rId4" r:qs="rId5" r:cs="rId6"/>
+          </a:graphicData>
+        </a:graphic>
+      </p:graphicFrame>
     </p:spTree>
     <p:extLst>
       <p:ext uri="{BB962C8B-B14F-4D97-AF65-F5344CB8AC3E}">
-        <p14:creationId xmlns:p14="http://schemas.microsoft.com/office/powerpoint/2010/main" val="1726217019"/>
+        <p14:creationId xmlns:p14="http://schemas.microsoft.com/office/powerpoint/2010/main" val="3935615501"/>
       </p:ext>
     </p:extLst>
   </p:cSld>
   <p:clrMapOvr>
     <a:masterClrMapping/>
   </p:clrMapOvr>
+  <p:transition spd="med">
+    <p:pull/>
+  </p:transition>
 </p:sld>
 </file>
 
-<file path=ppt/slides/slide3.xml><?xml version="1.0" encoding="utf-8"?>
+<file path=ppt/slides/slide2.xml><?xml version="1.0" encoding="utf-8"?>
 <p:sld xmlns:a="http://schemas.openxmlformats.org/drawingml/2006/main" xmlns:r="http://schemas.openxmlformats.org/officeDocument/2006/relationships" xmlns:p="http://schemas.openxmlformats.org/presentationml/2006/main">
   <p:cSld>
     <p:bg>
@@ -10587,10 +10993,10 @@
       </p:grpSpPr>
       <p:sp useBgFill="1">
         <p:nvSpPr>
-          <p:cNvPr id="43" name="Rectangle 34">
+          <p:cNvPr id="50" name="Rectangle 49">
             <a:extLst>
               <a:ext uri="{FF2B5EF4-FFF2-40B4-BE49-F238E27FC236}">
-                <a16:creationId xmlns:a16="http://schemas.microsoft.com/office/drawing/2014/main" id="{43A9B7B3-F171-4C25-99FC-C54250F0649B}"/>
+                <a16:creationId xmlns:a16="http://schemas.microsoft.com/office/drawing/2014/main" id="{8651CFA9-6065-4243-AC48-858E359780B1}"/>
               </a:ext>
               <a:ext uri="{C183D7F6-B498-43B3-948B-1728B52AA6E4}">
                 <adec:decorative xmlns:adec="http://schemas.microsoft.com/office/drawing/2017/decorative" val="1"/>
@@ -10641,7 +11047,7 @@
           <a:lstStyle/>
           <a:p>
             <a:pPr algn="ctr"/>
-            <a:endParaRPr lang="en-US" dirty="0">
+            <a:endParaRPr lang="en-US">
               <a:solidFill>
                 <a:schemeClr val="tx1">
                   <a:lumMod val="65000"/>
@@ -10655,10 +11061,10 @@
       </p:sp>
       <p:sp>
         <p:nvSpPr>
-          <p:cNvPr id="44" name="Rectangle 36">
+          <p:cNvPr id="52" name="Rectangle 51">
             <a:extLst>
               <a:ext uri="{FF2B5EF4-FFF2-40B4-BE49-F238E27FC236}">
-                <a16:creationId xmlns:a16="http://schemas.microsoft.com/office/drawing/2014/main" id="{D2D5C7C5-9C27-4A61-9F57-1857D45320FD}"/>
+                <a16:creationId xmlns:a16="http://schemas.microsoft.com/office/drawing/2014/main" id="{37962AE0-6A1C-4B76-9D52-10E5E6D7D3BB}"/>
               </a:ext>
               <a:ext uri="{C183D7F6-B498-43B3-948B-1728B52AA6E4}">
                 <adec:decorative xmlns:adec="http://schemas.microsoft.com/office/drawing/2017/decorative" val="1"/>
@@ -10678,7 +11084,7 @@
         </p:nvSpPr>
         <p:spPr>
           <a:xfrm>
-            <a:off x="3048" y="0"/>
+            <a:off x="0" y="0"/>
             <a:ext cx="12188952" cy="6858000"/>
           </a:xfrm>
           <a:prstGeom prst="rect">
@@ -10729,10 +11135,10 @@
       </p:sp>
       <p:grpSp>
         <p:nvGrpSpPr>
-          <p:cNvPr id="45" name="Group 38">
+          <p:cNvPr id="54" name="Group 53">
             <a:extLst>
               <a:ext uri="{FF2B5EF4-FFF2-40B4-BE49-F238E27FC236}">
-                <a16:creationId xmlns:a16="http://schemas.microsoft.com/office/drawing/2014/main" id="{12B335A1-0110-4D6F-BC0E-DCDCB432032B}"/>
+                <a16:creationId xmlns:a16="http://schemas.microsoft.com/office/drawing/2014/main" id="{7AB7BDB5-BE0D-446B-AA57-16A1D859E52B}"/>
               </a:ext>
               <a:ext uri="{C183D7F6-B498-43B3-948B-1728B52AA6E4}">
                 <adec:decorative xmlns:adec="http://schemas.microsoft.com/office/drawing/2017/decorative" val="1"/>
@@ -10751,19 +11157,19 @@
           </p:nvPr>
         </p:nvGrpSpPr>
         <p:grpSpPr>
-          <a:xfrm>
-            <a:off x="4464881" y="0"/>
-            <a:ext cx="7724071" cy="6858000"/>
-            <a:chOff x="4464881" y="0"/>
-            <a:chExt cx="7724071" cy="6858000"/>
+          <a:xfrm flipV="1">
+            <a:off x="3048" y="1"/>
+            <a:ext cx="5236971" cy="6858000"/>
+            <a:chOff x="20829" y="1"/>
+            <a:chExt cx="5236971" cy="6857999"/>
           </a:xfrm>
         </p:grpSpPr>
         <p:pic>
           <p:nvPicPr>
-            <p:cNvPr id="40" name="Picture 39">
+            <p:cNvPr id="55" name="Picture 54">
               <a:extLst>
                 <a:ext uri="{FF2B5EF4-FFF2-40B4-BE49-F238E27FC236}">
-                  <a16:creationId xmlns:a16="http://schemas.microsoft.com/office/drawing/2014/main" id="{3B05D9A1-5C36-49D4-8D83-8782DE1E1BCB}"/>
+                  <a16:creationId xmlns:a16="http://schemas.microsoft.com/office/drawing/2014/main" id="{8908FD00-E296-493C-89F7-EE7DB15D200A}"/>
                 </a:ext>
                 <a:ext uri="{C183D7F6-B498-43B3-948B-1728B52AA6E4}">
                   <adec:decorative xmlns:adec="http://schemas.microsoft.com/office/drawing/2017/decorative" val="1"/>
@@ -10803,8 +11209,8 @@
           </p:blipFill>
           <p:spPr>
             <a:xfrm>
-              <a:off x="7073255" y="0"/>
-              <a:ext cx="5115697" cy="6858000"/>
+              <a:off x="20829" y="692703"/>
+              <a:ext cx="5236971" cy="6165297"/>
             </a:xfrm>
             <a:prstGeom prst="rect">
               <a:avLst/>
@@ -10813,10 +11219,10 @@
         </p:pic>
         <p:pic>
           <p:nvPicPr>
-            <p:cNvPr id="41" name="Picture 40">
+            <p:cNvPr id="56" name="Picture 55">
               <a:extLst>
                 <a:ext uri="{FF2B5EF4-FFF2-40B4-BE49-F238E27FC236}">
-                  <a16:creationId xmlns:a16="http://schemas.microsoft.com/office/drawing/2014/main" id="{3D2C8D16-C3E9-4377-B192-9F3B9A8673D4}"/>
+                  <a16:creationId xmlns:a16="http://schemas.microsoft.com/office/drawing/2014/main" id="{0E9000E1-E55C-4724-B0E8-CC588826F51A}"/>
                 </a:ext>
                 <a:ext uri="{C183D7F6-B498-43B3-948B-1728B52AA6E4}">
                   <adec:decorative xmlns:adec="http://schemas.microsoft.com/office/drawing/2017/decorative" val="1"/>
@@ -10834,8 +11240,8 @@
               </p:extLst>
             </p:nvPr>
           </p:nvPicPr>
-          <p:blipFill>
-            <a:blip r:embed="rId3">
+          <p:blipFill rotWithShape="1">
+            <a:blip r:embed="rId2">
               <a:duotone>
                 <a:schemeClr val="accent6">
                   <a:shade val="45000"/>
@@ -10843,28 +11249,24 @@
                 </a:schemeClr>
                 <a:prstClr val="white"/>
               </a:duotone>
-              <a:alphaModFix amt="7000"/>
+              <a:alphaModFix amt="10000"/>
               <a:extLst>
                 <a:ext uri="{28A0092B-C50C-407E-A947-70E740481C1C}">
                   <a14:useLocalDpi xmlns:a14="http://schemas.microsoft.com/office/drawing/2010/main" val="0"/>
                 </a:ext>
               </a:extLst>
             </a:blip>
-            <a:stretch>
-              <a:fillRect/>
-            </a:stretch>
+            <a:srcRect l="19154" b="19117"/>
+            <a:stretch/>
           </p:blipFill>
           <p:spPr>
-            <a:xfrm rot="16200000">
-              <a:off x="5412135" y="-947254"/>
-              <a:ext cx="5562598" cy="7457106"/>
+            <a:xfrm rot="5400000">
+              <a:off x="393956" y="-373126"/>
+              <a:ext cx="4197222" cy="4943475"/>
             </a:xfrm>
             <a:prstGeom prst="rect">
               <a:avLst/>
             </a:prstGeom>
-            <a:effectLst>
-              <a:softEdge rad="0"/>
-            </a:effectLst>
           </p:spPr>
         </p:pic>
       </p:grpSp>
@@ -10886,8 +11288,8 @@
         </p:nvSpPr>
         <p:spPr>
           <a:xfrm>
-            <a:off x="1094391" y="381000"/>
-            <a:ext cx="10003218" cy="2057400"/>
+            <a:off x="838201" y="559813"/>
+            <a:ext cx="3352799" cy="5577934"/>
           </a:xfrm>
         </p:spPr>
         <p:txBody>
@@ -10898,7 +11300,7 @@
           <a:p>
             <a:pPr algn="ctr"/>
             <a:r>
-              <a:rPr lang="pt-BR"/>
+              <a:rPr lang="pt-BR" sz="3200" dirty="0"/>
               <a:t>Armazenamento de vinhos</a:t>
             </a:r>
           </a:p>
@@ -10920,21 +11322,60 @@
             <p:ph idx="1"/>
             <p:extLst>
               <p:ext uri="{D42A27DB-BD31-4B8C-83A1-F6EECF244321}">
-                <p14:modId xmlns:p14="http://schemas.microsoft.com/office/powerpoint/2010/main" val="2904189810"/>
+                <p14:modId xmlns:p14="http://schemas.microsoft.com/office/powerpoint/2010/main" val="1515564715"/>
               </p:ext>
             </p:extLst>
           </p:nvPr>
         </p:nvGraphicFramePr>
         <p:xfrm>
-          <a:off x="838200" y="2514600"/>
-          <a:ext cx="10515600" cy="3662363"/>
+          <a:off x="4807223" y="457200"/>
+          <a:ext cx="7003777" cy="5843605"/>
         </p:xfrm>
         <a:graphic>
           <a:graphicData uri="http://schemas.openxmlformats.org/drawingml/2006/diagram">
-            <dgm:relIds xmlns:dgm="http://schemas.openxmlformats.org/drawingml/2006/diagram" xmlns:r="http://schemas.openxmlformats.org/officeDocument/2006/relationships" r:dm="rId4" r:lo="rId5" r:qs="rId6" r:cs="rId7"/>
+            <dgm:relIds xmlns:dgm="http://schemas.openxmlformats.org/drawingml/2006/diagram" xmlns:r="http://schemas.openxmlformats.org/officeDocument/2006/relationships" r:dm="rId3" r:lo="rId4" r:qs="rId5" r:cs="rId6"/>
           </a:graphicData>
         </a:graphic>
       </p:graphicFrame>
+      <p:pic>
+        <p:nvPicPr>
+          <p:cNvPr id="12" name="Gráfico 11" descr="Vinho com preenchimento sólido">
+            <a:extLst>
+              <a:ext uri="{FF2B5EF4-FFF2-40B4-BE49-F238E27FC236}">
+                <a16:creationId xmlns:a16="http://schemas.microsoft.com/office/drawing/2014/main" id="{08698768-4BF1-B9F1-8DE3-60CAB546BF6D}"/>
+              </a:ext>
+            </a:extLst>
+          </p:cNvPr>
+          <p:cNvPicPr>
+            <a:picLocks noChangeAspect="1"/>
+          </p:cNvPicPr>
+          <p:nvPr/>
+        </p:nvPicPr>
+        <p:blipFill>
+          <a:blip r:embed="rId8">
+            <a:extLst>
+              <a:ext uri="{28A0092B-C50C-407E-A947-70E740481C1C}">
+                <a14:useLocalDpi xmlns:a14="http://schemas.microsoft.com/office/drawing/2010/main" val="0"/>
+              </a:ext>
+              <a:ext uri="{96DAC541-7B7A-43D3-8B79-37D633B846F1}">
+                <asvg:svgBlip xmlns:asvg="http://schemas.microsoft.com/office/drawing/2016/SVG/main" r:embed="rId9"/>
+              </a:ext>
+            </a:extLst>
+          </a:blip>
+          <a:stretch>
+            <a:fillRect/>
+          </a:stretch>
+        </p:blipFill>
+        <p:spPr>
+          <a:xfrm>
+            <a:off x="5324477" y="2921802"/>
+            <a:ext cx="914400" cy="914400"/>
+          </a:xfrm>
+          <a:prstGeom prst="rect">
+            <a:avLst/>
+          </a:prstGeom>
+        </p:spPr>
+      </p:pic>
     </p:spTree>
     <p:extLst>
       <p:ext uri="{BB962C8B-B14F-4D97-AF65-F5344CB8AC3E}">
@@ -10951,7 +11392,7 @@
 </p:sld>
 </file>
 
-<file path=ppt/slides/slide4.xml><?xml version="1.0" encoding="utf-8"?>
+<file path=ppt/slides/slide3.xml><?xml version="1.0" encoding="utf-8"?>
 <p:sld xmlns:a="http://schemas.openxmlformats.org/drawingml/2006/main" xmlns:r="http://schemas.openxmlformats.org/officeDocument/2006/relationships" xmlns:p="http://schemas.openxmlformats.org/presentationml/2006/main">
   <p:cSld>
     <p:bg>
@@ -11287,6 +11728,7 @@
           </a:bodyPr>
           <a:lstStyle/>
           <a:p>
+            <a:pPr algn="ctr"/>
             <a:r>
               <a:rPr lang="pt-BR" dirty="0"/>
               <a:t>A Soluções Grand Vinum</a:t>
@@ -11361,8 +11803,11 @@
           </a:bodyPr>
           <a:lstStyle/>
           <a:p>
+            <a:pPr marL="0" indent="0">
+              <a:buNone/>
+            </a:pPr>
             <a:r>
-              <a:rPr lang="pt-BR" sz="1800"/>
+              <a:rPr lang="pt-BR" sz="1800" dirty="0"/>
               <a:t>Somos uma empresa que tem como objetivo aprimorar o controle de temperatura e umidade, para um armazenamento supereficiente em vinícolas.</a:t>
             </a:r>
           </a:p>
@@ -11384,7 +11829,7 @@
 </p:sld>
 </file>
 
-<file path=ppt/slides/slide5.xml><?xml version="1.0" encoding="utf-8"?>
+<file path=ppt/slides/slide4.xml><?xml version="1.0" encoding="utf-8"?>
 <p:sld xmlns:a="http://schemas.openxmlformats.org/drawingml/2006/main" xmlns:r="http://schemas.openxmlformats.org/officeDocument/2006/relationships" xmlns:p="http://schemas.openxmlformats.org/presentationml/2006/main">
   <p:cSld>
     <p:bg>
@@ -11840,6 +12285,7 @@
           </a:bodyPr>
           <a:lstStyle/>
           <a:p>
+            <a:pPr algn="ctr"/>
             <a:r>
               <a:rPr lang="en-US" dirty="0"/>
               <a:t>Diagrama de visão de negócio</a:t>
@@ -11900,7 +12346,636 @@
 </p:sld>
 </file>
 
+<file path=ppt/slides/slide5.xml><?xml version="1.0" encoding="utf-8"?>
+<p:sld xmlns:a="http://schemas.openxmlformats.org/drawingml/2006/main" xmlns:r="http://schemas.openxmlformats.org/officeDocument/2006/relationships" xmlns:p="http://schemas.openxmlformats.org/presentationml/2006/main">
+  <p:cSld>
+    <p:bg>
+      <p:bgPr>
+        <a:solidFill>
+          <a:schemeClr val="bg1"/>
+        </a:solidFill>
+        <a:effectLst/>
+      </p:bgPr>
+    </p:bg>
+    <p:spTree>
+      <p:nvGrpSpPr>
+        <p:cNvPr id="1" name=""/>
+        <p:cNvGrpSpPr/>
+        <p:nvPr/>
+      </p:nvGrpSpPr>
+      <p:grpSpPr>
+        <a:xfrm>
+          <a:off x="0" y="0"/>
+          <a:ext cx="0" cy="0"/>
+          <a:chOff x="0" y="0"/>
+          <a:chExt cx="0" cy="0"/>
+        </a:xfrm>
+      </p:grpSpPr>
+      <p:sp>
+        <p:nvSpPr>
+          <p:cNvPr id="25" name="Rectangle 24">
+            <a:extLst>
+              <a:ext uri="{FF2B5EF4-FFF2-40B4-BE49-F238E27FC236}">
+                <a16:creationId xmlns:a16="http://schemas.microsoft.com/office/drawing/2014/main" id="{0BABF38A-8A0D-492E-BD20-6CF4D46B50BD}"/>
+              </a:ext>
+              <a:ext uri="{C183D7F6-B498-43B3-948B-1728B52AA6E4}">
+                <adec:decorative xmlns:adec="http://schemas.microsoft.com/office/drawing/2017/decorative" val="1"/>
+              </a:ext>
+            </a:extLst>
+          </p:cNvPr>
+          <p:cNvSpPr>
+            <a:spLocks noGrp="1" noRot="1" noChangeAspect="1" noMove="1" noResize="1" noEditPoints="1" noAdjustHandles="1" noChangeArrowheads="1" noChangeShapeType="1" noTextEdit="1"/>
+          </p:cNvSpPr>
+          <p:nvPr>
+            <p:extLst>
+              <p:ext uri="{386F3935-93C4-4BCD-93E2-E3B085C9AB24}">
+                <p16:designElem xmlns:p16="http://schemas.microsoft.com/office/powerpoint/2015/main" val="1"/>
+              </p:ext>
+            </p:extLst>
+          </p:nvPr>
+        </p:nvSpPr>
+        <p:spPr>
+          <a:xfrm>
+            <a:off x="0" y="0"/>
+            <a:ext cx="12192000" cy="6858004"/>
+          </a:xfrm>
+          <a:prstGeom prst="rect">
+            <a:avLst/>
+          </a:prstGeom>
+          <a:solidFill>
+            <a:schemeClr val="bg2">
+              <a:lumMod val="90000"/>
+              <a:alpha val="70000"/>
+            </a:schemeClr>
+          </a:solidFill>
+          <a:ln>
+            <a:noFill/>
+          </a:ln>
+        </p:spPr>
+        <p:style>
+          <a:lnRef idx="2">
+            <a:schemeClr val="accent1">
+              <a:shade val="50000"/>
+            </a:schemeClr>
+          </a:lnRef>
+          <a:fillRef idx="1">
+            <a:schemeClr val="accent1"/>
+          </a:fillRef>
+          <a:effectRef idx="0">
+            <a:schemeClr val="accent1"/>
+          </a:effectRef>
+          <a:fontRef idx="minor">
+            <a:schemeClr val="lt1"/>
+          </a:fontRef>
+        </p:style>
+        <p:txBody>
+          <a:bodyPr rtlCol="0" anchor="ctr"/>
+          <a:lstStyle/>
+          <a:p>
+            <a:pPr algn="ctr"/>
+            <a:endParaRPr lang="en-US" dirty="0">
+              <a:solidFill>
+                <a:schemeClr val="tx1">
+                  <a:lumMod val="65000"/>
+                  <a:lumOff val="35000"/>
+                </a:schemeClr>
+              </a:solidFill>
+              <a:latin typeface="AvenirNext LT Pro Medium" panose="020B0504020202020204" pitchFamily="34" charset="0"/>
+            </a:endParaRPr>
+          </a:p>
+        </p:txBody>
+      </p:sp>
+      <p:pic>
+        <p:nvPicPr>
+          <p:cNvPr id="27" name="Picture 26">
+            <a:extLst>
+              <a:ext uri="{FF2B5EF4-FFF2-40B4-BE49-F238E27FC236}">
+                <a16:creationId xmlns:a16="http://schemas.microsoft.com/office/drawing/2014/main" id="{BC526B7A-4801-4FD1-95C8-03AF22629E87}"/>
+              </a:ext>
+              <a:ext uri="{C183D7F6-B498-43B3-948B-1728B52AA6E4}">
+                <adec:decorative xmlns:adec="http://schemas.microsoft.com/office/drawing/2017/decorative" val="1"/>
+              </a:ext>
+            </a:extLst>
+          </p:cNvPr>
+          <p:cNvPicPr>
+            <a:picLocks noGrp="1" noRot="1" noChangeAspect="1" noMove="1" noResize="1" noEditPoints="1" noAdjustHandles="1" noChangeArrowheads="1" noChangeShapeType="1" noCrop="1"/>
+          </p:cNvPicPr>
+          <p:nvPr>
+            <p:extLst>
+              <p:ext uri="{386F3935-93C4-4BCD-93E2-E3B085C9AB24}">
+                <p16:designElem xmlns:p16="http://schemas.microsoft.com/office/powerpoint/2015/main" val="1"/>
+              </p:ext>
+            </p:extLst>
+          </p:nvPr>
+        </p:nvPicPr>
+        <p:blipFill>
+          <a:blip r:embed="rId2">
+            <a:alphaModFix amt="10000"/>
+            <a:extLst>
+              <a:ext uri="{28A0092B-C50C-407E-A947-70E740481C1C}">
+                <a14:useLocalDpi xmlns:a14="http://schemas.microsoft.com/office/drawing/2010/main" val="0"/>
+              </a:ext>
+            </a:extLst>
+          </a:blip>
+          <a:stretch>
+            <a:fillRect/>
+          </a:stretch>
+        </p:blipFill>
+        <p:spPr>
+          <a:xfrm>
+            <a:off x="8534400" y="0"/>
+            <a:ext cx="3654612" cy="4575348"/>
+          </a:xfrm>
+          <a:prstGeom prst="rect">
+            <a:avLst/>
+          </a:prstGeom>
+        </p:spPr>
+      </p:pic>
+      <p:sp useBgFill="1">
+        <p:nvSpPr>
+          <p:cNvPr id="29" name="Rectangle 28">
+            <a:extLst>
+              <a:ext uri="{FF2B5EF4-FFF2-40B4-BE49-F238E27FC236}">
+                <a16:creationId xmlns:a16="http://schemas.microsoft.com/office/drawing/2014/main" id="{297F7562-DBE2-4729-835D-1486BBB4373A}"/>
+              </a:ext>
+              <a:ext uri="{C183D7F6-B498-43B3-948B-1728B52AA6E4}">
+                <adec:decorative xmlns:adec="http://schemas.microsoft.com/office/drawing/2017/decorative" val="1"/>
+              </a:ext>
+            </a:extLst>
+          </p:cNvPr>
+          <p:cNvSpPr>
+            <a:spLocks noGrp="1" noRot="1" noChangeAspect="1" noMove="1" noResize="1" noEditPoints="1" noAdjustHandles="1" noChangeArrowheads="1" noChangeShapeType="1" noTextEdit="1"/>
+          </p:cNvSpPr>
+          <p:nvPr>
+            <p:extLst>
+              <p:ext uri="{386F3935-93C4-4BCD-93E2-E3B085C9AB24}">
+                <p16:designElem xmlns:p16="http://schemas.microsoft.com/office/powerpoint/2015/main" val="1"/>
+              </p:ext>
+            </p:extLst>
+          </p:nvPr>
+        </p:nvSpPr>
+        <p:spPr>
+          <a:xfrm>
+            <a:off x="3048" y="-2627"/>
+            <a:ext cx="12188952" cy="6858000"/>
+          </a:xfrm>
+          <a:prstGeom prst="rect">
+            <a:avLst/>
+          </a:prstGeom>
+          <a:ln>
+            <a:noFill/>
+          </a:ln>
+        </p:spPr>
+        <p:style>
+          <a:lnRef idx="2">
+            <a:schemeClr val="accent1">
+              <a:shade val="50000"/>
+            </a:schemeClr>
+          </a:lnRef>
+          <a:fillRef idx="1">
+            <a:schemeClr val="accent1"/>
+          </a:fillRef>
+          <a:effectRef idx="0">
+            <a:schemeClr val="accent1"/>
+          </a:effectRef>
+          <a:fontRef idx="minor">
+            <a:schemeClr val="lt1"/>
+          </a:fontRef>
+        </p:style>
+        <p:txBody>
+          <a:bodyPr rtlCol="0" anchor="ctr"/>
+          <a:lstStyle/>
+          <a:p>
+            <a:pPr algn="ctr"/>
+            <a:endParaRPr lang="en-US" dirty="0">
+              <a:solidFill>
+                <a:schemeClr val="tx1">
+                  <a:lumMod val="65000"/>
+                  <a:lumOff val="35000"/>
+                </a:schemeClr>
+              </a:solidFill>
+              <a:latin typeface="AvenirNext LT Pro Medium" panose="020B0504020202020204" pitchFamily="34" charset="0"/>
+            </a:endParaRPr>
+          </a:p>
+        </p:txBody>
+      </p:sp>
+      <p:sp>
+        <p:nvSpPr>
+          <p:cNvPr id="31" name="Rectangle 30">
+            <a:extLst>
+              <a:ext uri="{FF2B5EF4-FFF2-40B4-BE49-F238E27FC236}">
+                <a16:creationId xmlns:a16="http://schemas.microsoft.com/office/drawing/2014/main" id="{DCE0245F-7D4D-413E-940B-1D9D9A171161}"/>
+              </a:ext>
+              <a:ext uri="{C183D7F6-B498-43B3-948B-1728B52AA6E4}">
+                <adec:decorative xmlns:adec="http://schemas.microsoft.com/office/drawing/2017/decorative" val="1"/>
+              </a:ext>
+            </a:extLst>
+          </p:cNvPr>
+          <p:cNvSpPr>
+            <a:spLocks noGrp="1" noRot="1" noChangeAspect="1" noMove="1" noResize="1" noEditPoints="1" noAdjustHandles="1" noChangeArrowheads="1" noChangeShapeType="1" noTextEdit="1"/>
+          </p:cNvSpPr>
+          <p:nvPr>
+            <p:extLst>
+              <p:ext uri="{386F3935-93C4-4BCD-93E2-E3B085C9AB24}">
+                <p16:designElem xmlns:p16="http://schemas.microsoft.com/office/powerpoint/2015/main" val="1"/>
+              </p:ext>
+            </p:extLst>
+          </p:nvPr>
+        </p:nvSpPr>
+        <p:spPr>
+          <a:xfrm>
+            <a:off x="0" y="-2627"/>
+            <a:ext cx="12188952" cy="6858000"/>
+          </a:xfrm>
+          <a:prstGeom prst="rect">
+            <a:avLst/>
+          </a:prstGeom>
+          <a:solidFill>
+            <a:schemeClr val="bg2">
+              <a:lumMod val="90000"/>
+              <a:alpha val="70000"/>
+            </a:schemeClr>
+          </a:solidFill>
+          <a:ln>
+            <a:noFill/>
+          </a:ln>
+        </p:spPr>
+        <p:style>
+          <a:lnRef idx="2">
+            <a:schemeClr val="accent1">
+              <a:shade val="50000"/>
+            </a:schemeClr>
+          </a:lnRef>
+          <a:fillRef idx="1">
+            <a:schemeClr val="accent1"/>
+          </a:fillRef>
+          <a:effectRef idx="0">
+            <a:schemeClr val="accent1"/>
+          </a:effectRef>
+          <a:fontRef idx="minor">
+            <a:schemeClr val="lt1"/>
+          </a:fontRef>
+        </p:style>
+        <p:txBody>
+          <a:bodyPr rtlCol="0" anchor="ctr"/>
+          <a:lstStyle/>
+          <a:p>
+            <a:pPr algn="ctr"/>
+            <a:endParaRPr lang="en-US" dirty="0">
+              <a:solidFill>
+                <a:schemeClr val="tx1">
+                  <a:lumMod val="65000"/>
+                  <a:lumOff val="35000"/>
+                </a:schemeClr>
+              </a:solidFill>
+              <a:latin typeface="AvenirNext LT Pro Medium" panose="020B0504020202020204" pitchFamily="34" charset="0"/>
+            </a:endParaRPr>
+          </a:p>
+        </p:txBody>
+      </p:sp>
+      <p:grpSp>
+        <p:nvGrpSpPr>
+          <p:cNvPr id="33" name="Group 32">
+            <a:extLst>
+              <a:ext uri="{FF2B5EF4-FFF2-40B4-BE49-F238E27FC236}">
+                <a16:creationId xmlns:a16="http://schemas.microsoft.com/office/drawing/2014/main" id="{5BB11B77-16CE-4796-9677-F0ED67FCEC1B}"/>
+              </a:ext>
+              <a:ext uri="{C183D7F6-B498-43B3-948B-1728B52AA6E4}">
+                <adec:decorative xmlns:adec="http://schemas.microsoft.com/office/drawing/2017/decorative" val="1"/>
+              </a:ext>
+            </a:extLst>
+          </p:cNvPr>
+          <p:cNvGrpSpPr>
+            <a:grpSpLocks noGrp="1" noUngrp="1" noRot="1" noChangeAspect="1" noMove="1" noResize="1"/>
+          </p:cNvGrpSpPr>
+          <p:nvPr>
+            <p:extLst>
+              <p:ext uri="{386F3935-93C4-4BCD-93E2-E3B085C9AB24}">
+                <p16:designElem xmlns:p16="http://schemas.microsoft.com/office/powerpoint/2015/main" val="1"/>
+              </p:ext>
+            </p:extLst>
+          </p:nvPr>
+        </p:nvGrpSpPr>
+        <p:grpSpPr>
+          <a:xfrm flipH="1">
+            <a:off x="0" y="0"/>
+            <a:ext cx="7724071" cy="6858000"/>
+            <a:chOff x="4464881" y="0"/>
+            <a:chExt cx="7724071" cy="6858000"/>
+          </a:xfrm>
+        </p:grpSpPr>
+        <p:pic>
+          <p:nvPicPr>
+            <p:cNvPr id="34" name="Picture 33">
+              <a:extLst>
+                <a:ext uri="{FF2B5EF4-FFF2-40B4-BE49-F238E27FC236}">
+                  <a16:creationId xmlns:a16="http://schemas.microsoft.com/office/drawing/2014/main" id="{EF26510D-AF6F-45BA-9996-9EA0F149D097}"/>
+                </a:ext>
+                <a:ext uri="{C183D7F6-B498-43B3-948B-1728B52AA6E4}">
+                  <adec:decorative xmlns:adec="http://schemas.microsoft.com/office/drawing/2017/decorative" val="1"/>
+                </a:ext>
+              </a:extLst>
+            </p:cNvPr>
+            <p:cNvPicPr>
+              <a:picLocks noChangeAspect="1"/>
+            </p:cNvPicPr>
+            <p:nvPr>
+              <p:extLst>
+                <p:ext uri="{386F3935-93C4-4BCD-93E2-E3B085C9AB24}">
+                  <p16:designElem xmlns:p16="http://schemas.microsoft.com/office/powerpoint/2015/main" val="1"/>
+                </p:ext>
+              </p:extLst>
+            </p:nvPr>
+          </p:nvPicPr>
+          <p:blipFill>
+            <a:blip r:embed="rId3">
+              <a:duotone>
+                <a:schemeClr val="accent6">
+                  <a:shade val="45000"/>
+                  <a:satMod val="135000"/>
+                </a:schemeClr>
+                <a:prstClr val="white"/>
+              </a:duotone>
+              <a:alphaModFix amt="15000"/>
+              <a:extLst>
+                <a:ext uri="{28A0092B-C50C-407E-A947-70E740481C1C}">
+                  <a14:useLocalDpi xmlns:a14="http://schemas.microsoft.com/office/drawing/2010/main" val="0"/>
+                </a:ext>
+              </a:extLst>
+            </a:blip>
+            <a:stretch>
+              <a:fillRect/>
+            </a:stretch>
+          </p:blipFill>
+          <p:spPr>
+            <a:xfrm>
+              <a:off x="7073255" y="0"/>
+              <a:ext cx="5115697" cy="6858000"/>
+            </a:xfrm>
+            <a:prstGeom prst="rect">
+              <a:avLst/>
+            </a:prstGeom>
+          </p:spPr>
+        </p:pic>
+        <p:pic>
+          <p:nvPicPr>
+            <p:cNvPr id="35" name="Picture 34">
+              <a:extLst>
+                <a:ext uri="{FF2B5EF4-FFF2-40B4-BE49-F238E27FC236}">
+                  <a16:creationId xmlns:a16="http://schemas.microsoft.com/office/drawing/2014/main" id="{5E04EA3F-927A-42F5-96EF-44DCE97863D0}"/>
+                </a:ext>
+                <a:ext uri="{C183D7F6-B498-43B3-948B-1728B52AA6E4}">
+                  <adec:decorative xmlns:adec="http://schemas.microsoft.com/office/drawing/2017/decorative" val="1"/>
+                </a:ext>
+              </a:extLst>
+            </p:cNvPr>
+            <p:cNvPicPr>
+              <a:picLocks noChangeAspect="1"/>
+            </p:cNvPicPr>
+            <p:nvPr>
+              <p:extLst>
+                <p:ext uri="{386F3935-93C4-4BCD-93E2-E3B085C9AB24}">
+                  <p16:designElem xmlns:p16="http://schemas.microsoft.com/office/powerpoint/2015/main" val="1"/>
+                </p:ext>
+              </p:extLst>
+            </p:nvPr>
+          </p:nvPicPr>
+          <p:blipFill>
+            <a:blip r:embed="rId4">
+              <a:duotone>
+                <a:schemeClr val="accent6">
+                  <a:shade val="45000"/>
+                  <a:satMod val="135000"/>
+                </a:schemeClr>
+                <a:prstClr val="white"/>
+              </a:duotone>
+              <a:alphaModFix amt="7000"/>
+              <a:extLst>
+                <a:ext uri="{28A0092B-C50C-407E-A947-70E740481C1C}">
+                  <a14:useLocalDpi xmlns:a14="http://schemas.microsoft.com/office/drawing/2010/main" val="0"/>
+                </a:ext>
+              </a:extLst>
+            </a:blip>
+            <a:stretch>
+              <a:fillRect/>
+            </a:stretch>
+          </p:blipFill>
+          <p:spPr>
+            <a:xfrm rot="16200000">
+              <a:off x="5412135" y="-947254"/>
+              <a:ext cx="5562598" cy="7457106"/>
+            </a:xfrm>
+            <a:prstGeom prst="rect">
+              <a:avLst/>
+            </a:prstGeom>
+            <a:effectLst>
+              <a:softEdge rad="0"/>
+            </a:effectLst>
+          </p:spPr>
+        </p:pic>
+      </p:grpSp>
+      <p:sp>
+        <p:nvSpPr>
+          <p:cNvPr id="2" name="Título 1">
+            <a:extLst>
+              <a:ext uri="{FF2B5EF4-FFF2-40B4-BE49-F238E27FC236}">
+                <a16:creationId xmlns:a16="http://schemas.microsoft.com/office/drawing/2014/main" id="{5E34E59F-E44F-8F02-009D-EDBAFEDA90EA}"/>
+              </a:ext>
+            </a:extLst>
+          </p:cNvPr>
+          <p:cNvSpPr>
+            <a:spLocks noGrp="1"/>
+          </p:cNvSpPr>
+          <p:nvPr>
+            <p:ph type="title"/>
+          </p:nvPr>
+        </p:nvSpPr>
+        <p:spPr>
+          <a:xfrm>
+            <a:off x="7409930" y="744909"/>
+            <a:ext cx="4323376" cy="2912691"/>
+          </a:xfrm>
+        </p:spPr>
+        <p:txBody>
+          <a:bodyPr vert="horz" lIns="91440" tIns="45720" rIns="91440" bIns="45720" rtlCol="0" anchor="b">
+            <a:normAutofit/>
+          </a:bodyPr>
+          <a:lstStyle/>
+          <a:p>
+            <a:pPr algn="ctr"/>
+            <a:r>
+              <a:rPr lang="en-US" dirty="0"/>
+              <a:t>Ferramenta de </a:t>
+            </a:r>
+            <a:r>
+              <a:rPr lang="en-US" dirty="0" err="1"/>
+              <a:t>Gestão</a:t>
+            </a:r>
+            <a:endParaRPr lang="en-US" dirty="0"/>
+          </a:p>
+        </p:txBody>
+      </p:sp>
+      <p:pic>
+        <p:nvPicPr>
+          <p:cNvPr id="5" name="Imagem 4" descr="Logotipo&#10;&#10;Descrição gerada automaticamente">
+            <a:extLst>
+              <a:ext uri="{FF2B5EF4-FFF2-40B4-BE49-F238E27FC236}">
+                <a16:creationId xmlns:a16="http://schemas.microsoft.com/office/drawing/2014/main" id="{A4F1F74F-B1B3-585F-6A93-703B63EEAFC7}"/>
+              </a:ext>
+            </a:extLst>
+          </p:cNvPr>
+          <p:cNvPicPr>
+            <a:picLocks noChangeAspect="1"/>
+          </p:cNvPicPr>
+          <p:nvPr/>
+        </p:nvPicPr>
+        <p:blipFill>
+          <a:blip r:embed="rId5">
+            <a:extLst>
+              <a:ext uri="{28A0092B-C50C-407E-A947-70E740481C1C}">
+                <a14:useLocalDpi xmlns:a14="http://schemas.microsoft.com/office/drawing/2010/main" val="0"/>
+              </a:ext>
+            </a:extLst>
+          </a:blip>
+          <a:stretch>
+            <a:fillRect/>
+          </a:stretch>
+        </p:blipFill>
+        <p:spPr>
+          <a:xfrm>
+            <a:off x="603229" y="1625750"/>
+            <a:ext cx="6402214" cy="3601245"/>
+          </a:xfrm>
+          <a:prstGeom prst="rect">
+            <a:avLst/>
+          </a:prstGeom>
+        </p:spPr>
+      </p:pic>
+    </p:spTree>
+    <p:extLst>
+      <p:ext uri="{BB962C8B-B14F-4D97-AF65-F5344CB8AC3E}">
+        <p14:creationId xmlns:p14="http://schemas.microsoft.com/office/powerpoint/2010/main" val="4100431085"/>
+      </p:ext>
+    </p:extLst>
+  </p:cSld>
+  <p:clrMapOvr>
+    <a:masterClrMapping/>
+  </p:clrMapOvr>
+  <p:transition spd="med">
+    <p:pull/>
+  </p:transition>
+</p:sld>
+</file>
+
 <file path=ppt/slides/slide6.xml><?xml version="1.0" encoding="utf-8"?>
+<p:sld xmlns:a="http://schemas.openxmlformats.org/drawingml/2006/main" xmlns:r="http://schemas.openxmlformats.org/officeDocument/2006/relationships" xmlns:p="http://schemas.openxmlformats.org/presentationml/2006/main">
+  <p:cSld>
+    <p:spTree>
+      <p:nvGrpSpPr>
+        <p:cNvPr id="1" name=""/>
+        <p:cNvGrpSpPr/>
+        <p:nvPr/>
+      </p:nvGrpSpPr>
+      <p:grpSpPr>
+        <a:xfrm>
+          <a:off x="0" y="0"/>
+          <a:ext cx="0" cy="0"/>
+          <a:chOff x="0" y="0"/>
+          <a:chExt cx="0" cy="0"/>
+        </a:xfrm>
+      </p:grpSpPr>
+      <p:sp>
+        <p:nvSpPr>
+          <p:cNvPr id="2" name="Título 1">
+            <a:extLst>
+              <a:ext uri="{FF2B5EF4-FFF2-40B4-BE49-F238E27FC236}">
+                <a16:creationId xmlns:a16="http://schemas.microsoft.com/office/drawing/2014/main" id="{4F4D23B5-5B40-6E98-726F-4A1A2A9C4A9E}"/>
+              </a:ext>
+            </a:extLst>
+          </p:cNvPr>
+          <p:cNvSpPr>
+            <a:spLocks noGrp="1"/>
+          </p:cNvSpPr>
+          <p:nvPr>
+            <p:ph type="title"/>
+          </p:nvPr>
+        </p:nvSpPr>
+        <p:spPr>
+          <a:xfrm>
+            <a:off x="458694" y="746006"/>
+            <a:ext cx="10895106" cy="1325563"/>
+          </a:xfrm>
+        </p:spPr>
+        <p:txBody>
+          <a:bodyPr/>
+          <a:lstStyle/>
+          <a:p>
+            <a:pPr algn="ctr"/>
+            <a:r>
+              <a:rPr lang="pt-BR"/>
+              <a:t>Site Institucional</a:t>
+            </a:r>
+            <a:endParaRPr lang="pt-BR" dirty="0"/>
+          </a:p>
+        </p:txBody>
+      </p:sp>
+      <p:pic>
+        <p:nvPicPr>
+          <p:cNvPr id="5" name="Gráfico 4" descr="Internet estrutura de tópicos">
+            <a:extLst>
+              <a:ext uri="{FF2B5EF4-FFF2-40B4-BE49-F238E27FC236}">
+                <a16:creationId xmlns:a16="http://schemas.microsoft.com/office/drawing/2014/main" id="{78899A95-B546-52E0-A72C-93A7C7076C86}"/>
+              </a:ext>
+            </a:extLst>
+          </p:cNvPr>
+          <p:cNvPicPr>
+            <a:picLocks noChangeAspect="1"/>
+          </p:cNvPicPr>
+          <p:nvPr/>
+        </p:nvPicPr>
+        <p:blipFill>
+          <a:blip r:embed="rId2">
+            <a:extLst>
+              <a:ext uri="{28A0092B-C50C-407E-A947-70E740481C1C}">
+                <a14:useLocalDpi xmlns:a14="http://schemas.microsoft.com/office/drawing/2010/main" val="0"/>
+              </a:ext>
+              <a:ext uri="{96DAC541-7B7A-43D3-8B79-37D633B846F1}">
+                <asvg:svgBlip xmlns:asvg="http://schemas.microsoft.com/office/drawing/2016/SVG/main" r:embed="rId3"/>
+              </a:ext>
+            </a:extLst>
+          </a:blip>
+          <a:stretch>
+            <a:fillRect/>
+          </a:stretch>
+        </p:blipFill>
+        <p:spPr>
+          <a:xfrm>
+            <a:off x="4120653" y="1691323"/>
+            <a:ext cx="3571188" cy="3571188"/>
+          </a:xfrm>
+          <a:prstGeom prst="rect">
+            <a:avLst/>
+          </a:prstGeom>
+          <a:effectLst/>
+        </p:spPr>
+      </p:pic>
+    </p:spTree>
+    <p:extLst>
+      <p:ext uri="{BB962C8B-B14F-4D97-AF65-F5344CB8AC3E}">
+        <p14:creationId xmlns:p14="http://schemas.microsoft.com/office/powerpoint/2010/main" val="3649494082"/>
+      </p:ext>
+    </p:extLst>
+  </p:cSld>
+  <p:clrMapOvr>
+    <a:masterClrMapping/>
+  </p:clrMapOvr>
+  <p:transition spd="med">
+    <p:pull/>
+  </p:transition>
+</p:sld>
+</file>
+
+<file path=ppt/slides/slide7.xml><?xml version="1.0" encoding="utf-8"?>
 <p:sld xmlns:a="http://schemas.openxmlformats.org/drawingml/2006/main" xmlns:r="http://schemas.openxmlformats.org/officeDocument/2006/relationships" xmlns:p="http://schemas.openxmlformats.org/presentationml/2006/main">
   <p:cSld>
     <p:bg>
@@ -12050,7 +13125,7 @@
           <p:cNvPr id="14" name="Rectangle 13">
             <a:extLst>
               <a:ext uri="{FF2B5EF4-FFF2-40B4-BE49-F238E27FC236}">
-                <a16:creationId xmlns:a16="http://schemas.microsoft.com/office/drawing/2014/main" id="{297F7562-DBE2-4729-835D-1486BBB4373A}"/>
+                <a16:creationId xmlns:a16="http://schemas.microsoft.com/office/drawing/2014/main" id="{37FDDF72-DE39-4F99-A3C1-DD9D7815D7DB}"/>
               </a:ext>
               <a:ext uri="{C183D7F6-B498-43B3-948B-1728B52AA6E4}">
                 <adec:decorative xmlns:adec="http://schemas.microsoft.com/office/drawing/2017/decorative" val="1"/>
@@ -12070,8 +13145,8 @@
         </p:nvSpPr>
         <p:spPr>
           <a:xfrm>
-            <a:off x="3048" y="-2627"/>
-            <a:ext cx="12188952" cy="6858000"/>
+            <a:off x="0" y="0"/>
+            <a:ext cx="12192000" cy="6858000"/>
           </a:xfrm>
           <a:prstGeom prst="rect">
             <a:avLst/>
@@ -12118,7 +13193,7 @@
           <p:cNvPr id="16" name="Rectangle 15">
             <a:extLst>
               <a:ext uri="{FF2B5EF4-FFF2-40B4-BE49-F238E27FC236}">
-                <a16:creationId xmlns:a16="http://schemas.microsoft.com/office/drawing/2014/main" id="{DCE0245F-7D4D-413E-940B-1D9D9A171161}"/>
+                <a16:creationId xmlns:a16="http://schemas.microsoft.com/office/drawing/2014/main" id="{5E4ECE80-3AD1-450C-B62A-98788F193948}"/>
               </a:ext>
               <a:ext uri="{C183D7F6-B498-43B3-948B-1728B52AA6E4}">
                 <adec:decorative xmlns:adec="http://schemas.microsoft.com/office/drawing/2017/decorative" val="1"/>
@@ -12138,17 +13213,14 @@
         </p:nvSpPr>
         <p:spPr>
           <a:xfrm>
-            <a:off x="0" y="-2627"/>
-            <a:ext cx="12188952" cy="6858000"/>
+            <a:off x="0" y="0"/>
+            <a:ext cx="12192000" cy="6858000"/>
           </a:xfrm>
           <a:prstGeom prst="rect">
             <a:avLst/>
           </a:prstGeom>
           <a:solidFill>
-            <a:schemeClr val="bg2">
-              <a:lumMod val="90000"/>
-              <a:alpha val="70000"/>
-            </a:schemeClr>
+            <a:srgbClr val="000000"/>
           </a:solidFill>
           <a:ln>
             <a:noFill/>
@@ -12187,203 +13259,24 @@
           </a:p>
         </p:txBody>
       </p:sp>
-      <p:grpSp>
-        <p:nvGrpSpPr>
-          <p:cNvPr id="18" name="Group 17">
-            <a:extLst>
-              <a:ext uri="{FF2B5EF4-FFF2-40B4-BE49-F238E27FC236}">
-                <a16:creationId xmlns:a16="http://schemas.microsoft.com/office/drawing/2014/main" id="{5BB11B77-16CE-4796-9677-F0ED67FCEC1B}"/>
-              </a:ext>
-              <a:ext uri="{C183D7F6-B498-43B3-948B-1728B52AA6E4}">
-                <adec:decorative xmlns:adec="http://schemas.microsoft.com/office/drawing/2017/decorative" val="1"/>
-              </a:ext>
-            </a:extLst>
-          </p:cNvPr>
-          <p:cNvGrpSpPr>
-            <a:grpSpLocks noGrp="1" noUngrp="1" noRot="1" noChangeAspect="1" noMove="1" noResize="1"/>
-          </p:cNvGrpSpPr>
-          <p:nvPr>
-            <p:extLst>
-              <p:ext uri="{386F3935-93C4-4BCD-93E2-E3B085C9AB24}">
-                <p16:designElem xmlns:p16="http://schemas.microsoft.com/office/powerpoint/2015/main" val="1"/>
-              </p:ext>
-            </p:extLst>
-          </p:nvPr>
-        </p:nvGrpSpPr>
-        <p:grpSpPr>
-          <a:xfrm flipH="1">
-            <a:off x="0" y="0"/>
-            <a:ext cx="7724071" cy="6858000"/>
-            <a:chOff x="4464881" y="0"/>
-            <a:chExt cx="7724071" cy="6858000"/>
-          </a:xfrm>
-        </p:grpSpPr>
-        <p:pic>
-          <p:nvPicPr>
-            <p:cNvPr id="19" name="Picture 18">
-              <a:extLst>
-                <a:ext uri="{FF2B5EF4-FFF2-40B4-BE49-F238E27FC236}">
-                  <a16:creationId xmlns:a16="http://schemas.microsoft.com/office/drawing/2014/main" id="{EF26510D-AF6F-45BA-9996-9EA0F149D097}"/>
-                </a:ext>
-                <a:ext uri="{C183D7F6-B498-43B3-948B-1728B52AA6E4}">
-                  <adec:decorative xmlns:adec="http://schemas.microsoft.com/office/drawing/2017/decorative" val="1"/>
-                </a:ext>
-              </a:extLst>
-            </p:cNvPr>
-            <p:cNvPicPr>
-              <a:picLocks noChangeAspect="1"/>
-            </p:cNvPicPr>
-            <p:nvPr>
-              <p:extLst>
-                <p:ext uri="{386F3935-93C4-4BCD-93E2-E3B085C9AB24}">
-                  <p16:designElem xmlns:p16="http://schemas.microsoft.com/office/powerpoint/2015/main" val="1"/>
-                </p:ext>
-              </p:extLst>
-            </p:nvPr>
-          </p:nvPicPr>
-          <p:blipFill>
-            <a:blip r:embed="rId3">
-              <a:duotone>
-                <a:schemeClr val="accent6">
-                  <a:shade val="45000"/>
-                  <a:satMod val="135000"/>
-                </a:schemeClr>
-                <a:prstClr val="white"/>
-              </a:duotone>
-              <a:alphaModFix amt="15000"/>
-              <a:extLst>
-                <a:ext uri="{28A0092B-C50C-407E-A947-70E740481C1C}">
-                  <a14:useLocalDpi xmlns:a14="http://schemas.microsoft.com/office/drawing/2010/main" val="0"/>
-                </a:ext>
-              </a:extLst>
-            </a:blip>
-            <a:stretch>
-              <a:fillRect/>
-            </a:stretch>
-          </p:blipFill>
-          <p:spPr>
-            <a:xfrm>
-              <a:off x="7073255" y="0"/>
-              <a:ext cx="5115697" cy="6858000"/>
-            </a:xfrm>
-            <a:prstGeom prst="rect">
-              <a:avLst/>
-            </a:prstGeom>
-          </p:spPr>
-        </p:pic>
-        <p:pic>
-          <p:nvPicPr>
-            <p:cNvPr id="20" name="Picture 19">
-              <a:extLst>
-                <a:ext uri="{FF2B5EF4-FFF2-40B4-BE49-F238E27FC236}">
-                  <a16:creationId xmlns:a16="http://schemas.microsoft.com/office/drawing/2014/main" id="{5E04EA3F-927A-42F5-96EF-44DCE97863D0}"/>
-                </a:ext>
-                <a:ext uri="{C183D7F6-B498-43B3-948B-1728B52AA6E4}">
-                  <adec:decorative xmlns:adec="http://schemas.microsoft.com/office/drawing/2017/decorative" val="1"/>
-                </a:ext>
-              </a:extLst>
-            </p:cNvPr>
-            <p:cNvPicPr>
-              <a:picLocks noChangeAspect="1"/>
-            </p:cNvPicPr>
-            <p:nvPr>
-              <p:extLst>
-                <p:ext uri="{386F3935-93C4-4BCD-93E2-E3B085C9AB24}">
-                  <p16:designElem xmlns:p16="http://schemas.microsoft.com/office/powerpoint/2015/main" val="1"/>
-                </p:ext>
-              </p:extLst>
-            </p:nvPr>
-          </p:nvPicPr>
-          <p:blipFill>
-            <a:blip r:embed="rId4">
-              <a:duotone>
-                <a:schemeClr val="accent6">
-                  <a:shade val="45000"/>
-                  <a:satMod val="135000"/>
-                </a:schemeClr>
-                <a:prstClr val="white"/>
-              </a:duotone>
-              <a:alphaModFix amt="7000"/>
-              <a:extLst>
-                <a:ext uri="{28A0092B-C50C-407E-A947-70E740481C1C}">
-                  <a14:useLocalDpi xmlns:a14="http://schemas.microsoft.com/office/drawing/2010/main" val="0"/>
-                </a:ext>
-              </a:extLst>
-            </a:blip>
-            <a:stretch>
-              <a:fillRect/>
-            </a:stretch>
-          </p:blipFill>
-          <p:spPr>
-            <a:xfrm rot="16200000">
-              <a:off x="5412135" y="-947254"/>
-              <a:ext cx="5562598" cy="7457106"/>
-            </a:xfrm>
-            <a:prstGeom prst="rect">
-              <a:avLst/>
-            </a:prstGeom>
-            <a:effectLst>
-              <a:softEdge rad="0"/>
-            </a:effectLst>
-          </p:spPr>
-        </p:pic>
-      </p:grpSp>
-      <p:sp>
-        <p:nvSpPr>
-          <p:cNvPr id="2" name="Título 1">
-            <a:extLst>
-              <a:ext uri="{FF2B5EF4-FFF2-40B4-BE49-F238E27FC236}">
-                <a16:creationId xmlns:a16="http://schemas.microsoft.com/office/drawing/2014/main" id="{5E34E59F-E44F-8F02-009D-EDBAFEDA90EA}"/>
-              </a:ext>
-            </a:extLst>
-          </p:cNvPr>
-          <p:cNvSpPr>
-            <a:spLocks noGrp="1"/>
-          </p:cNvSpPr>
-          <p:nvPr>
-            <p:ph type="title"/>
-          </p:nvPr>
-        </p:nvSpPr>
-        <p:spPr>
-          <a:xfrm>
-            <a:off x="7409930" y="744909"/>
-            <a:ext cx="4323376" cy="2912691"/>
-          </a:xfrm>
-        </p:spPr>
-        <p:txBody>
-          <a:bodyPr vert="horz" lIns="91440" tIns="45720" rIns="91440" bIns="45720" rtlCol="0" anchor="b">
-            <a:normAutofit/>
-          </a:bodyPr>
-          <a:lstStyle/>
-          <a:p>
-            <a:r>
-              <a:rPr lang="en-US" dirty="0"/>
-              <a:t>Ferramenta de </a:t>
-            </a:r>
-            <a:r>
-              <a:rPr lang="en-US" dirty="0" err="1"/>
-              <a:t>Gestão</a:t>
-            </a:r>
-            <a:endParaRPr lang="en-US" dirty="0"/>
-          </a:p>
-        </p:txBody>
-      </p:sp>
       <p:pic>
         <p:nvPicPr>
-          <p:cNvPr id="5" name="Imagem 4" descr="Logotipo&#10;&#10;Descrição gerada automaticamente">
+          <p:cNvPr id="8" name="Espaço Reservado para Conteúdo 7" descr="Mulher de barril">
             <a:extLst>
               <a:ext uri="{FF2B5EF4-FFF2-40B4-BE49-F238E27FC236}">
-                <a16:creationId xmlns:a16="http://schemas.microsoft.com/office/drawing/2014/main" id="{A4F1F74F-B1B3-585F-6A93-703B63EEAFC7}"/>
+                <a16:creationId xmlns:a16="http://schemas.microsoft.com/office/drawing/2014/main" id="{3CBCA916-1912-A939-81AC-98DDDF7AAC97}"/>
               </a:ext>
             </a:extLst>
           </p:cNvPr>
           <p:cNvPicPr>
-            <a:picLocks noChangeAspect="1"/>
+            <a:picLocks noGrp="1" noChangeAspect="1"/>
           </p:cNvPicPr>
-          <p:nvPr/>
+          <p:nvPr>
+            <p:ph idx="1"/>
+          </p:nvPr>
         </p:nvPicPr>
         <p:blipFill>
-          <a:blip r:embed="rId5">
+          <a:blip r:embed="rId3">
             <a:extLst>
               <a:ext uri="{28A0092B-C50C-407E-A947-70E740481C1C}">
                 <a14:useLocalDpi xmlns:a14="http://schemas.microsoft.com/office/drawing/2010/main" val="0"/>
@@ -12396,132 +13289,24 @@
         </p:blipFill>
         <p:spPr>
           <a:xfrm>
-            <a:off x="602552" y="1295402"/>
-            <a:ext cx="6402214" cy="3601245"/>
+            <a:off x="-1" y="-4"/>
+            <a:ext cx="12197953" cy="6858000"/>
           </a:xfrm>
-          <a:prstGeom prst="rect">
-            <a:avLst/>
-          </a:prstGeom>
-          <a:effectLst>
-            <a:reflection blurRad="6350" stA="52000" endA="300" endPos="35000" dir="5400000" sy="-100000" algn="bl" rotWithShape="0"/>
-          </a:effectLst>
         </p:spPr>
       </p:pic>
     </p:spTree>
     <p:extLst>
       <p:ext uri="{BB962C8B-B14F-4D97-AF65-F5344CB8AC3E}">
-        <p14:creationId xmlns:p14="http://schemas.microsoft.com/office/powerpoint/2010/main" val="4100431085"/>
+        <p14:creationId xmlns:p14="http://schemas.microsoft.com/office/powerpoint/2010/main" val="2591896202"/>
       </p:ext>
     </p:extLst>
   </p:cSld>
   <p:clrMapOvr>
     <a:masterClrMapping/>
   </p:clrMapOvr>
-</p:sld>
-</file>
-
-<file path=ppt/slides/slide7.xml><?xml version="1.0" encoding="utf-8"?>
-<p:sld xmlns:a="http://schemas.openxmlformats.org/drawingml/2006/main" xmlns:r="http://schemas.openxmlformats.org/officeDocument/2006/relationships" xmlns:p="http://schemas.openxmlformats.org/presentationml/2006/main">
-  <p:cSld>
-    <p:spTree>
-      <p:nvGrpSpPr>
-        <p:cNvPr id="1" name=""/>
-        <p:cNvGrpSpPr/>
-        <p:nvPr/>
-      </p:nvGrpSpPr>
-      <p:grpSpPr>
-        <a:xfrm>
-          <a:off x="0" y="0"/>
-          <a:ext cx="0" cy="0"/>
-          <a:chOff x="0" y="0"/>
-          <a:chExt cx="0" cy="0"/>
-        </a:xfrm>
-      </p:grpSpPr>
-      <p:sp>
-        <p:nvSpPr>
-          <p:cNvPr id="2" name="Título 1">
-            <a:extLst>
-              <a:ext uri="{FF2B5EF4-FFF2-40B4-BE49-F238E27FC236}">
-                <a16:creationId xmlns:a16="http://schemas.microsoft.com/office/drawing/2014/main" id="{4F4D23B5-5B40-6E98-726F-4A1A2A9C4A9E}"/>
-              </a:ext>
-            </a:extLst>
-          </p:cNvPr>
-          <p:cNvSpPr>
-            <a:spLocks noGrp="1"/>
-          </p:cNvSpPr>
-          <p:nvPr>
-            <p:ph type="title"/>
-          </p:nvPr>
-        </p:nvSpPr>
-        <p:spPr>
-          <a:xfrm>
-            <a:off x="458694" y="746006"/>
-            <a:ext cx="10895106" cy="1325563"/>
-          </a:xfrm>
-        </p:spPr>
-        <p:txBody>
-          <a:bodyPr/>
-          <a:lstStyle/>
-          <a:p>
-            <a:pPr algn="ctr"/>
-            <a:r>
-              <a:rPr lang="pt-BR"/>
-              <a:t>Site Institucional</a:t>
-            </a:r>
-            <a:endParaRPr lang="pt-BR" dirty="0"/>
-          </a:p>
-        </p:txBody>
-      </p:sp>
-      <p:pic>
-        <p:nvPicPr>
-          <p:cNvPr id="5" name="Gráfico 4" descr="Internet estrutura de tópicos">
-            <a:extLst>
-              <a:ext uri="{FF2B5EF4-FFF2-40B4-BE49-F238E27FC236}">
-                <a16:creationId xmlns:a16="http://schemas.microsoft.com/office/drawing/2014/main" id="{78899A95-B546-52E0-A72C-93A7C7076C86}"/>
-              </a:ext>
-            </a:extLst>
-          </p:cNvPr>
-          <p:cNvPicPr>
-            <a:picLocks noChangeAspect="1"/>
-          </p:cNvPicPr>
-          <p:nvPr/>
-        </p:nvPicPr>
-        <p:blipFill>
-          <a:blip r:embed="rId2">
-            <a:extLst>
-              <a:ext uri="{28A0092B-C50C-407E-A947-70E740481C1C}">
-                <a14:useLocalDpi xmlns:a14="http://schemas.microsoft.com/office/drawing/2010/main" val="0"/>
-              </a:ext>
-              <a:ext uri="{96DAC541-7B7A-43D3-8B79-37D633B846F1}">
-                <asvg:svgBlip xmlns:asvg="http://schemas.microsoft.com/office/drawing/2016/SVG/main" r:embed="rId3"/>
-              </a:ext>
-            </a:extLst>
-          </a:blip>
-          <a:stretch>
-            <a:fillRect/>
-          </a:stretch>
-        </p:blipFill>
-        <p:spPr>
-          <a:xfrm>
-            <a:off x="4120653" y="1691323"/>
-            <a:ext cx="3571188" cy="3571188"/>
-          </a:xfrm>
-          <a:prstGeom prst="rect">
-            <a:avLst/>
-          </a:prstGeom>
-          <a:effectLst/>
-        </p:spPr>
-      </p:pic>
-    </p:spTree>
-    <p:extLst>
-      <p:ext uri="{BB962C8B-B14F-4D97-AF65-F5344CB8AC3E}">
-        <p14:creationId xmlns:p14="http://schemas.microsoft.com/office/powerpoint/2010/main" val="3649494082"/>
-      </p:ext>
-    </p:extLst>
-  </p:cSld>
-  <p:clrMapOvr>
-    <a:masterClrMapping/>
-  </p:clrMapOvr>
+  <p:transition spd="med">
+    <p:pull/>
+  </p:transition>
 </p:sld>
 </file>
 
@@ -12675,7 +13460,7 @@
           <p:cNvPr id="14" name="Rectangle 13">
             <a:extLst>
               <a:ext uri="{FF2B5EF4-FFF2-40B4-BE49-F238E27FC236}">
-                <a16:creationId xmlns:a16="http://schemas.microsoft.com/office/drawing/2014/main" id="{37FDDF72-DE39-4F99-A3C1-DD9D7815D7DB}"/>
+                <a16:creationId xmlns:a16="http://schemas.microsoft.com/office/drawing/2014/main" id="{310E06F9-9F12-4D1B-92C0-4B30818D093E}"/>
               </a:ext>
               <a:ext uri="{C183D7F6-B498-43B3-948B-1728B52AA6E4}">
                 <adec:decorative xmlns:adec="http://schemas.microsoft.com/office/drawing/2017/decorative" val="1"/>
@@ -12696,7 +13481,7 @@
         <p:spPr>
           <a:xfrm>
             <a:off x="0" y="0"/>
-            <a:ext cx="12192000" cy="6858000"/>
+            <a:ext cx="12188952" cy="6858000"/>
           </a:xfrm>
           <a:prstGeom prst="rect">
             <a:avLst/>
@@ -12743,219 +13528,7 @@
           <p:cNvPr id="16" name="Rectangle 15">
             <a:extLst>
               <a:ext uri="{FF2B5EF4-FFF2-40B4-BE49-F238E27FC236}">
-                <a16:creationId xmlns:a16="http://schemas.microsoft.com/office/drawing/2014/main" id="{5E4ECE80-3AD1-450C-B62A-98788F193948}"/>
-              </a:ext>
-              <a:ext uri="{C183D7F6-B498-43B3-948B-1728B52AA6E4}">
-                <adec:decorative xmlns:adec="http://schemas.microsoft.com/office/drawing/2017/decorative" val="1"/>
-              </a:ext>
-            </a:extLst>
-          </p:cNvPr>
-          <p:cNvSpPr>
-            <a:spLocks noGrp="1" noRot="1" noChangeAspect="1" noMove="1" noResize="1" noEditPoints="1" noAdjustHandles="1" noChangeArrowheads="1" noChangeShapeType="1" noTextEdit="1"/>
-          </p:cNvSpPr>
-          <p:nvPr>
-            <p:extLst>
-              <p:ext uri="{386F3935-93C4-4BCD-93E2-E3B085C9AB24}">
-                <p16:designElem xmlns:p16="http://schemas.microsoft.com/office/powerpoint/2015/main" val="1"/>
-              </p:ext>
-            </p:extLst>
-          </p:nvPr>
-        </p:nvSpPr>
-        <p:spPr>
-          <a:xfrm>
-            <a:off x="0" y="0"/>
-            <a:ext cx="12192000" cy="6858000"/>
-          </a:xfrm>
-          <a:prstGeom prst="rect">
-            <a:avLst/>
-          </a:prstGeom>
-          <a:solidFill>
-            <a:srgbClr val="000000"/>
-          </a:solidFill>
-          <a:ln>
-            <a:noFill/>
-          </a:ln>
-        </p:spPr>
-        <p:style>
-          <a:lnRef idx="2">
-            <a:schemeClr val="accent1">
-              <a:shade val="50000"/>
-            </a:schemeClr>
-          </a:lnRef>
-          <a:fillRef idx="1">
-            <a:schemeClr val="accent1"/>
-          </a:fillRef>
-          <a:effectRef idx="0">
-            <a:schemeClr val="accent1"/>
-          </a:effectRef>
-          <a:fontRef idx="minor">
-            <a:schemeClr val="lt1"/>
-          </a:fontRef>
-        </p:style>
-        <p:txBody>
-          <a:bodyPr rtlCol="0" anchor="ctr"/>
-          <a:lstStyle/>
-          <a:p>
-            <a:pPr algn="ctr"/>
-            <a:endParaRPr lang="en-US" dirty="0">
-              <a:solidFill>
-                <a:schemeClr val="tx1">
-                  <a:lumMod val="65000"/>
-                  <a:lumOff val="35000"/>
-                </a:schemeClr>
-              </a:solidFill>
-              <a:latin typeface="AvenirNext LT Pro Medium" panose="020B0504020202020204" pitchFamily="34" charset="0"/>
-            </a:endParaRPr>
-          </a:p>
-        </p:txBody>
-      </p:sp>
-      <p:pic>
-        <p:nvPicPr>
-          <p:cNvPr id="8" name="Espaço Reservado para Conteúdo 7" descr="Mulher de barril">
-            <a:extLst>
-              <a:ext uri="{FF2B5EF4-FFF2-40B4-BE49-F238E27FC236}">
-                <a16:creationId xmlns:a16="http://schemas.microsoft.com/office/drawing/2014/main" id="{3CBCA916-1912-A939-81AC-98DDDF7AAC97}"/>
-              </a:ext>
-            </a:extLst>
-          </p:cNvPr>
-          <p:cNvPicPr>
-            <a:picLocks noGrp="1" noChangeAspect="1"/>
-          </p:cNvPicPr>
-          <p:nvPr>
-            <p:ph idx="1"/>
-          </p:nvPr>
-        </p:nvPicPr>
-        <p:blipFill>
-          <a:blip r:embed="rId3">
-            <a:extLst>
-              <a:ext uri="{28A0092B-C50C-407E-A947-70E740481C1C}">
-                <a14:useLocalDpi xmlns:a14="http://schemas.microsoft.com/office/drawing/2010/main" val="0"/>
-              </a:ext>
-            </a:extLst>
-          </a:blip>
-          <a:stretch>
-            <a:fillRect/>
-          </a:stretch>
-        </p:blipFill>
-        <p:spPr>
-          <a:xfrm>
-            <a:off x="-1" y="-4"/>
-            <a:ext cx="12197953" cy="6858000"/>
-          </a:xfrm>
-        </p:spPr>
-      </p:pic>
-    </p:spTree>
-    <p:extLst>
-      <p:ext uri="{BB962C8B-B14F-4D97-AF65-F5344CB8AC3E}">
-        <p14:creationId xmlns:p14="http://schemas.microsoft.com/office/powerpoint/2010/main" val="2591896202"/>
-      </p:ext>
-    </p:extLst>
-  </p:cSld>
-  <p:clrMapOvr>
-    <a:masterClrMapping/>
-  </p:clrMapOvr>
-</p:sld>
-</file>
-
-<file path=ppt/slides/slide9.xml><?xml version="1.0" encoding="utf-8"?>
-<p:sld xmlns:a="http://schemas.openxmlformats.org/drawingml/2006/main" xmlns:r="http://schemas.openxmlformats.org/officeDocument/2006/relationships" xmlns:p="http://schemas.openxmlformats.org/presentationml/2006/main">
-  <p:cSld>
-    <p:bg>
-      <p:bgPr>
-        <a:solidFill>
-          <a:schemeClr val="bg1"/>
-        </a:solidFill>
-        <a:effectLst/>
-      </p:bgPr>
-    </p:bg>
-    <p:spTree>
-      <p:nvGrpSpPr>
-        <p:cNvPr id="1" name=""/>
-        <p:cNvGrpSpPr/>
-        <p:nvPr/>
-      </p:nvGrpSpPr>
-      <p:grpSpPr>
-        <a:xfrm>
-          <a:off x="0" y="0"/>
-          <a:ext cx="0" cy="0"/>
-          <a:chOff x="0" y="0"/>
-          <a:chExt cx="0" cy="0"/>
-        </a:xfrm>
-      </p:grpSpPr>
-      <p:sp useBgFill="1">
-        <p:nvSpPr>
-          <p:cNvPr id="29" name="Rectangle 28">
-            <a:extLst>
-              <a:ext uri="{FF2B5EF4-FFF2-40B4-BE49-F238E27FC236}">
-                <a16:creationId xmlns:a16="http://schemas.microsoft.com/office/drawing/2014/main" id="{8651CFA9-6065-4243-AC48-858E359780B1}"/>
-              </a:ext>
-              <a:ext uri="{C183D7F6-B498-43B3-948B-1728B52AA6E4}">
-                <adec:decorative xmlns:adec="http://schemas.microsoft.com/office/drawing/2017/decorative" val="1"/>
-              </a:ext>
-            </a:extLst>
-          </p:cNvPr>
-          <p:cNvSpPr>
-            <a:spLocks noGrp="1" noRot="1" noChangeAspect="1" noMove="1" noResize="1" noEditPoints="1" noAdjustHandles="1" noChangeArrowheads="1" noChangeShapeType="1" noTextEdit="1"/>
-          </p:cNvSpPr>
-          <p:nvPr>
-            <p:extLst>
-              <p:ext uri="{386F3935-93C4-4BCD-93E2-E3B085C9AB24}">
-                <p16:designElem xmlns:p16="http://schemas.microsoft.com/office/powerpoint/2015/main" val="1"/>
-              </p:ext>
-            </p:extLst>
-          </p:nvPr>
-        </p:nvSpPr>
-        <p:spPr>
-          <a:xfrm>
-            <a:off x="3048" y="0"/>
-            <a:ext cx="12188952" cy="6858000"/>
-          </a:xfrm>
-          <a:prstGeom prst="rect">
-            <a:avLst/>
-          </a:prstGeom>
-          <a:ln>
-            <a:noFill/>
-          </a:ln>
-        </p:spPr>
-        <p:style>
-          <a:lnRef idx="2">
-            <a:schemeClr val="accent1">
-              <a:shade val="50000"/>
-            </a:schemeClr>
-          </a:lnRef>
-          <a:fillRef idx="1">
-            <a:schemeClr val="accent1"/>
-          </a:fillRef>
-          <a:effectRef idx="0">
-            <a:schemeClr val="accent1"/>
-          </a:effectRef>
-          <a:fontRef idx="minor">
-            <a:schemeClr val="lt1"/>
-          </a:fontRef>
-        </p:style>
-        <p:txBody>
-          <a:bodyPr rtlCol="0" anchor="ctr"/>
-          <a:lstStyle/>
-          <a:p>
-            <a:pPr algn="ctr"/>
-            <a:endParaRPr lang="en-US">
-              <a:solidFill>
-                <a:schemeClr val="tx1">
-                  <a:lumMod val="65000"/>
-                  <a:lumOff val="35000"/>
-                </a:schemeClr>
-              </a:solidFill>
-              <a:latin typeface="AvenirNext LT Pro Medium" panose="020B0504020202020204" pitchFamily="34" charset="0"/>
-            </a:endParaRPr>
-          </a:p>
-        </p:txBody>
-      </p:sp>
-      <p:sp>
-        <p:nvSpPr>
-          <p:cNvPr id="31" name="Rectangle 30">
-            <a:extLst>
-              <a:ext uri="{FF2B5EF4-FFF2-40B4-BE49-F238E27FC236}">
-                <a16:creationId xmlns:a16="http://schemas.microsoft.com/office/drawing/2014/main" id="{37962AE0-6A1C-4B76-9D52-10E5E6D7D3BB}"/>
+                <a16:creationId xmlns:a16="http://schemas.microsoft.com/office/drawing/2014/main" id="{7DA29CF3-8B8B-4DDF-A19B-72E0059DD5DC}"/>
               </a:ext>
               <a:ext uri="{C183D7F6-B498-43B3-948B-1728B52AA6E4}">
                 <adec:decorative xmlns:adec="http://schemas.microsoft.com/office/drawing/2017/decorative" val="1"/>
@@ -13026,10 +13599,10 @@
       </p:sp>
       <p:grpSp>
         <p:nvGrpSpPr>
-          <p:cNvPr id="33" name="Group 32">
+          <p:cNvPr id="18" name="Group 17">
             <a:extLst>
               <a:ext uri="{FF2B5EF4-FFF2-40B4-BE49-F238E27FC236}">
-                <a16:creationId xmlns:a16="http://schemas.microsoft.com/office/drawing/2014/main" id="{191D96BF-0605-446D-9590-F9A64BF8E7F9}"/>
+                <a16:creationId xmlns:a16="http://schemas.microsoft.com/office/drawing/2014/main" id="{7AFE7A50-2D5F-4DF3-B28D-A8F7E624D88C}"/>
               </a:ext>
               <a:ext uri="{C183D7F6-B498-43B3-948B-1728B52AA6E4}">
                 <adec:decorative xmlns:adec="http://schemas.microsoft.com/office/drawing/2017/decorative" val="1"/>
@@ -13048,19 +13621,19 @@
           </p:nvPr>
         </p:nvGrpSpPr>
         <p:grpSpPr>
-          <a:xfrm flipV="1">
-            <a:off x="3048" y="1"/>
-            <a:ext cx="5236971" cy="6858000"/>
-            <a:chOff x="20829" y="1"/>
-            <a:chExt cx="5236971" cy="6857999"/>
+          <a:xfrm>
+            <a:off x="4464881" y="0"/>
+            <a:ext cx="7724071" cy="6858000"/>
+            <a:chOff x="4464881" y="0"/>
+            <a:chExt cx="7724071" cy="6858000"/>
           </a:xfrm>
         </p:grpSpPr>
         <p:pic>
           <p:nvPicPr>
-            <p:cNvPr id="34" name="Picture 33">
+            <p:cNvPr id="19" name="Picture 18">
               <a:extLst>
                 <a:ext uri="{FF2B5EF4-FFF2-40B4-BE49-F238E27FC236}">
-                  <a16:creationId xmlns:a16="http://schemas.microsoft.com/office/drawing/2014/main" id="{B79C2449-D531-4936-82F1-C560A12818D9}"/>
+                  <a16:creationId xmlns:a16="http://schemas.microsoft.com/office/drawing/2014/main" id="{326F236B-5DB7-4DCD-947A-8DDD0C76992F}"/>
                 </a:ext>
                 <a:ext uri="{C183D7F6-B498-43B3-948B-1728B52AA6E4}">
                   <adec:decorative xmlns:adec="http://schemas.microsoft.com/office/drawing/2017/decorative" val="1"/>
@@ -13079,7 +13652,7 @@
             </p:nvPr>
           </p:nvPicPr>
           <p:blipFill>
-            <a:blip r:embed="rId2">
+            <a:blip r:embed="rId3">
               <a:duotone>
                 <a:schemeClr val="accent6">
                   <a:shade val="45000"/>
@@ -13087,7 +13660,7 @@
                 </a:schemeClr>
                 <a:prstClr val="white"/>
               </a:duotone>
-              <a:alphaModFix amt="10000"/>
+              <a:alphaModFix amt="15000"/>
               <a:extLst>
                 <a:ext uri="{28A0092B-C50C-407E-A947-70E740481C1C}">
                   <a14:useLocalDpi xmlns:a14="http://schemas.microsoft.com/office/drawing/2010/main" val="0"/>
@@ -13100,8 +13673,8 @@
           </p:blipFill>
           <p:spPr>
             <a:xfrm>
-              <a:off x="20829" y="692703"/>
-              <a:ext cx="5236971" cy="6165297"/>
+              <a:off x="7073255" y="0"/>
+              <a:ext cx="5115697" cy="6858000"/>
             </a:xfrm>
             <a:prstGeom prst="rect">
               <a:avLst/>
@@ -13110,10 +13683,10 @@
         </p:pic>
         <p:pic>
           <p:nvPicPr>
-            <p:cNvPr id="35" name="Picture 34">
+            <p:cNvPr id="20" name="Picture 19">
               <a:extLst>
                 <a:ext uri="{FF2B5EF4-FFF2-40B4-BE49-F238E27FC236}">
-                  <a16:creationId xmlns:a16="http://schemas.microsoft.com/office/drawing/2014/main" id="{E881F028-6F1E-42D8-B367-94F963C44CF3}"/>
+                  <a16:creationId xmlns:a16="http://schemas.microsoft.com/office/drawing/2014/main" id="{6CC716D4-FE59-42BE-AA9B-254EF6C1BC83}"/>
                 </a:ext>
                 <a:ext uri="{C183D7F6-B498-43B3-948B-1728B52AA6E4}">
                   <adec:decorative xmlns:adec="http://schemas.microsoft.com/office/drawing/2017/decorative" val="1"/>
@@ -13131,8 +13704,8 @@
               </p:extLst>
             </p:nvPr>
           </p:nvPicPr>
-          <p:blipFill rotWithShape="1">
-            <a:blip r:embed="rId2">
+          <p:blipFill>
+            <a:blip r:embed="rId4">
               <a:duotone>
                 <a:schemeClr val="accent6">
                   <a:shade val="45000"/>
@@ -13140,24 +13713,28 @@
                 </a:schemeClr>
                 <a:prstClr val="white"/>
               </a:duotone>
-              <a:alphaModFix amt="10000"/>
+              <a:alphaModFix amt="7000"/>
               <a:extLst>
                 <a:ext uri="{28A0092B-C50C-407E-A947-70E740481C1C}">
                   <a14:useLocalDpi xmlns:a14="http://schemas.microsoft.com/office/drawing/2010/main" val="0"/>
                 </a:ext>
               </a:extLst>
             </a:blip>
-            <a:srcRect l="19154" b="19117"/>
-            <a:stretch/>
+            <a:stretch>
+              <a:fillRect/>
+            </a:stretch>
           </p:blipFill>
           <p:spPr>
-            <a:xfrm rot="5400000">
-              <a:off x="393956" y="-373126"/>
-              <a:ext cx="4197222" cy="4943475"/>
+            <a:xfrm rot="16200000">
+              <a:off x="5412135" y="-947254"/>
+              <a:ext cx="5562598" cy="7457106"/>
             </a:xfrm>
             <a:prstGeom prst="rect">
               <a:avLst/>
             </a:prstGeom>
+            <a:effectLst>
+              <a:softEdge rad="0"/>
+            </a:effectLst>
           </p:spPr>
         </p:pic>
       </p:grpSp>
@@ -13166,7 +13743,7 @@
           <p:cNvPr id="2" name="Título 1">
             <a:extLst>
               <a:ext uri="{FF2B5EF4-FFF2-40B4-BE49-F238E27FC236}">
-                <a16:creationId xmlns:a16="http://schemas.microsoft.com/office/drawing/2014/main" id="{2A3C7BB3-0A8C-6A6F-432D-E972702F9EAB}"/>
+                <a16:creationId xmlns:a16="http://schemas.microsoft.com/office/drawing/2014/main" id="{6E2A80DA-0317-ED54-48DD-7A5A800F9F75}"/>
               </a:ext>
             </a:extLst>
           </p:cNvPr>
@@ -13179,64 +13756,265 @@
         </p:nvSpPr>
         <p:spPr>
           <a:xfrm>
-            <a:off x="838201" y="559813"/>
-            <a:ext cx="4876800" cy="5577934"/>
+            <a:off x="3722750" y="742948"/>
+            <a:ext cx="4743450" cy="752477"/>
           </a:xfrm>
         </p:spPr>
         <p:txBody>
-          <a:bodyPr>
-            <a:normAutofit/>
+          <a:bodyPr vert="horz" lIns="91440" tIns="45720" rIns="91440" bIns="45720" rtlCol="0" anchor="b">
+            <a:normAutofit fontScale="90000"/>
           </a:bodyPr>
           <a:lstStyle/>
           <a:p>
             <a:r>
-              <a:rPr lang="pt-BR"/>
-              <a:t>Próximos passos</a:t>
+              <a:rPr lang="en-US" dirty="0"/>
+              <a:t>Simulador financeiro</a:t>
             </a:r>
           </a:p>
         </p:txBody>
       </p:sp>
-      <p:graphicFrame>
-        <p:nvGraphicFramePr>
-          <p:cNvPr id="5" name="Espaço Reservado para Conteúdo 2">
+      <p:pic>
+        <p:nvPicPr>
+          <p:cNvPr id="5" name="Espaço Reservado para Conteúdo 4" descr="Calculadora com preenchimento sólido">
             <a:extLst>
               <a:ext uri="{FF2B5EF4-FFF2-40B4-BE49-F238E27FC236}">
-                <a16:creationId xmlns:a16="http://schemas.microsoft.com/office/drawing/2014/main" id="{A3344D0C-99F1-1570-01F1-D929C9C31B58}"/>
+                <a16:creationId xmlns:a16="http://schemas.microsoft.com/office/drawing/2014/main" id="{E6239CBA-974C-5631-6CA6-71DCC0ABE7E8}"/>
               </a:ext>
             </a:extLst>
           </p:cNvPr>
-          <p:cNvGraphicFramePr>
-            <a:graphicFrameLocks noGrp="1"/>
-          </p:cNvGraphicFramePr>
+          <p:cNvPicPr>
+            <a:picLocks noGrp="1" noChangeAspect="1"/>
+          </p:cNvPicPr>
           <p:nvPr>
             <p:ph idx="1"/>
-            <p:extLst>
-              <p:ext uri="{D42A27DB-BD31-4B8C-83A1-F6EECF244321}">
-                <p14:modId xmlns:p14="http://schemas.microsoft.com/office/powerpoint/2010/main" val="1454695392"/>
-              </p:ext>
-            </p:extLst>
           </p:nvPr>
-        </p:nvGraphicFramePr>
-        <p:xfrm>
-          <a:off x="6184458" y="343433"/>
-          <a:ext cx="5626542" cy="5785658"/>
-        </p:xfrm>
-        <a:graphic>
-          <a:graphicData uri="http://schemas.openxmlformats.org/drawingml/2006/diagram">
-            <dgm:relIds xmlns:dgm="http://schemas.openxmlformats.org/drawingml/2006/diagram" xmlns:r="http://schemas.openxmlformats.org/officeDocument/2006/relationships" r:dm="rId3" r:lo="rId4" r:qs="rId5" r:cs="rId6"/>
-          </a:graphicData>
-        </a:graphic>
-      </p:graphicFrame>
+        </p:nvPicPr>
+        <p:blipFill>
+          <a:blip r:embed="rId5">
+            <a:alphaModFix/>
+            <a:extLst>
+              <a:ext uri="{28A0092B-C50C-407E-A947-70E740481C1C}">
+                <a14:useLocalDpi xmlns:a14="http://schemas.microsoft.com/office/drawing/2010/main" val="0"/>
+              </a:ext>
+              <a:ext uri="{96DAC541-7B7A-43D3-8B79-37D633B846F1}">
+                <asvg:svgBlip xmlns:asvg="http://schemas.microsoft.com/office/drawing/2016/SVG/main" r:embed="rId6"/>
+              </a:ext>
+            </a:extLst>
+          </a:blip>
+          <a:stretch>
+            <a:fillRect/>
+          </a:stretch>
+        </p:blipFill>
+        <p:spPr>
+          <a:xfrm>
+            <a:off x="2007841" y="1762123"/>
+            <a:ext cx="4171949" cy="4171949"/>
+          </a:xfrm>
+          <a:prstGeom prst="rect">
+            <a:avLst/>
+          </a:prstGeom>
+          <a:effectLst>
+            <a:outerShdw blurRad="50800" dist="38100" dir="2700000" algn="tl" rotWithShape="0">
+              <a:prstClr val="black">
+                <a:alpha val="40000"/>
+              </a:prstClr>
+            </a:outerShdw>
+          </a:effectLst>
+        </p:spPr>
+      </p:pic>
+      <p:pic>
+        <p:nvPicPr>
+          <p:cNvPr id="7" name="Gráfico 6" descr="Gráfico de barras com preenchimento sólido">
+            <a:extLst>
+              <a:ext uri="{FF2B5EF4-FFF2-40B4-BE49-F238E27FC236}">
+                <a16:creationId xmlns:a16="http://schemas.microsoft.com/office/drawing/2014/main" id="{5C08AA96-F95D-2913-F987-2711A400BDEE}"/>
+              </a:ext>
+            </a:extLst>
+          </p:cNvPr>
+          <p:cNvPicPr>
+            <a:picLocks noChangeAspect="1"/>
+          </p:cNvPicPr>
+          <p:nvPr/>
+        </p:nvPicPr>
+        <p:blipFill>
+          <a:blip r:embed="rId7">
+            <a:extLst>
+              <a:ext uri="{28A0092B-C50C-407E-A947-70E740481C1C}">
+                <a14:useLocalDpi xmlns:a14="http://schemas.microsoft.com/office/drawing/2010/main" val="0"/>
+              </a:ext>
+              <a:ext uri="{96DAC541-7B7A-43D3-8B79-37D633B846F1}">
+                <asvg:svgBlip xmlns:asvg="http://schemas.microsoft.com/office/drawing/2016/SVG/main" r:embed="rId8"/>
+              </a:ext>
+            </a:extLst>
+          </a:blip>
+          <a:stretch>
+            <a:fillRect/>
+          </a:stretch>
+        </p:blipFill>
+        <p:spPr>
+          <a:xfrm>
+            <a:off x="5744550" y="2076451"/>
+            <a:ext cx="4038601" cy="4038601"/>
+          </a:xfrm>
+          <a:prstGeom prst="rect">
+            <a:avLst/>
+          </a:prstGeom>
+          <a:effectLst>
+            <a:outerShdw blurRad="50800" dist="38100" dir="2700000" algn="tl" rotWithShape="0">
+              <a:prstClr val="black">
+                <a:alpha val="40000"/>
+              </a:prstClr>
+            </a:outerShdw>
+          </a:effectLst>
+        </p:spPr>
+      </p:pic>
     </p:spTree>
     <p:extLst>
       <p:ext uri="{BB962C8B-B14F-4D97-AF65-F5344CB8AC3E}">
-        <p14:creationId xmlns:p14="http://schemas.microsoft.com/office/powerpoint/2010/main" val="3935615501"/>
+        <p14:creationId xmlns:p14="http://schemas.microsoft.com/office/powerpoint/2010/main" val="2409610260"/>
       </p:ext>
     </p:extLst>
   </p:cSld>
   <p:clrMapOvr>
     <a:masterClrMapping/>
   </p:clrMapOvr>
+  <p:transition spd="med">
+    <p:pull/>
+  </p:transition>
+</p:sld>
+</file>
+
+<file path=ppt/slides/slide9.xml><?xml version="1.0" encoding="utf-8"?>
+<p:sld xmlns:a="http://schemas.openxmlformats.org/drawingml/2006/main" xmlns:r="http://schemas.openxmlformats.org/officeDocument/2006/relationships" xmlns:p="http://schemas.openxmlformats.org/presentationml/2006/main">
+  <p:cSld>
+    <p:spTree>
+      <p:nvGrpSpPr>
+        <p:cNvPr id="1" name=""/>
+        <p:cNvGrpSpPr/>
+        <p:nvPr/>
+      </p:nvGrpSpPr>
+      <p:grpSpPr>
+        <a:xfrm>
+          <a:off x="0" y="0"/>
+          <a:ext cx="0" cy="0"/>
+          <a:chOff x="0" y="0"/>
+          <a:chExt cx="0" cy="0"/>
+        </a:xfrm>
+      </p:grpSpPr>
+      <p:sp>
+        <p:nvSpPr>
+          <p:cNvPr id="2" name="Título 1">
+            <a:extLst>
+              <a:ext uri="{FF2B5EF4-FFF2-40B4-BE49-F238E27FC236}">
+                <a16:creationId xmlns:a16="http://schemas.microsoft.com/office/drawing/2014/main" id="{85F249A8-6896-1DAF-69C9-5633AE8EEF09}"/>
+              </a:ext>
+            </a:extLst>
+          </p:cNvPr>
+          <p:cNvSpPr>
+            <a:spLocks noGrp="1"/>
+          </p:cNvSpPr>
+          <p:nvPr>
+            <p:ph type="title"/>
+          </p:nvPr>
+        </p:nvSpPr>
+        <p:spPr/>
+        <p:txBody>
+          <a:bodyPr/>
+          <a:lstStyle/>
+          <a:p>
+            <a:pPr algn="ctr"/>
+            <a:r>
+              <a:rPr lang="pt-BR" dirty="0"/>
+              <a:t>Tabelas do Banco de Dados</a:t>
+            </a:r>
+          </a:p>
+        </p:txBody>
+      </p:sp>
+      <p:pic>
+        <p:nvPicPr>
+          <p:cNvPr id="7" name="Imagem 6" descr="Ícone&#10;&#10;Descrição gerada automaticamente">
+            <a:extLst>
+              <a:ext uri="{FF2B5EF4-FFF2-40B4-BE49-F238E27FC236}">
+                <a16:creationId xmlns:a16="http://schemas.microsoft.com/office/drawing/2014/main" id="{CCCD749D-B4F7-1764-4F85-3E59AB5E9C65}"/>
+              </a:ext>
+            </a:extLst>
+          </p:cNvPr>
+          <p:cNvPicPr>
+            <a:picLocks noChangeAspect="1"/>
+          </p:cNvPicPr>
+          <p:nvPr/>
+        </p:nvPicPr>
+        <p:blipFill>
+          <a:blip r:embed="rId2">
+            <a:extLst>
+              <a:ext uri="{28A0092B-C50C-407E-A947-70E740481C1C}">
+                <a14:useLocalDpi xmlns:a14="http://schemas.microsoft.com/office/drawing/2010/main" val="0"/>
+              </a:ext>
+            </a:extLst>
+          </a:blip>
+          <a:stretch>
+            <a:fillRect/>
+          </a:stretch>
+        </p:blipFill>
+        <p:spPr>
+          <a:xfrm>
+            <a:off x="7089458" y="2330766"/>
+            <a:ext cx="2826067" cy="2826067"/>
+          </a:xfrm>
+          <a:prstGeom prst="rect">
+            <a:avLst/>
+          </a:prstGeom>
+        </p:spPr>
+      </p:pic>
+      <p:pic>
+        <p:nvPicPr>
+          <p:cNvPr id="11" name="Imagem 10" descr="Ícone&#10;&#10;Descrição gerada automaticamente">
+            <a:extLst>
+              <a:ext uri="{FF2B5EF4-FFF2-40B4-BE49-F238E27FC236}">
+                <a16:creationId xmlns:a16="http://schemas.microsoft.com/office/drawing/2014/main" id="{316C1CFB-FB2D-791E-21BA-1129C65FD3AC}"/>
+              </a:ext>
+            </a:extLst>
+          </p:cNvPr>
+          <p:cNvPicPr>
+            <a:picLocks noChangeAspect="1"/>
+          </p:cNvPicPr>
+          <p:nvPr/>
+        </p:nvPicPr>
+        <p:blipFill>
+          <a:blip r:embed="rId3">
+            <a:extLst>
+              <a:ext uri="{28A0092B-C50C-407E-A947-70E740481C1C}">
+                <a14:useLocalDpi xmlns:a14="http://schemas.microsoft.com/office/drawing/2010/main" val="0"/>
+              </a:ext>
+            </a:extLst>
+          </a:blip>
+          <a:stretch>
+            <a:fillRect/>
+          </a:stretch>
+        </p:blipFill>
+        <p:spPr>
+          <a:xfrm>
+            <a:off x="1664107" y="1646915"/>
+            <a:ext cx="4346168" cy="4346168"/>
+          </a:xfrm>
+          <a:prstGeom prst="rect">
+            <a:avLst/>
+          </a:prstGeom>
+        </p:spPr>
+      </p:pic>
+    </p:spTree>
+    <p:extLst>
+      <p:ext uri="{BB962C8B-B14F-4D97-AF65-F5344CB8AC3E}">
+        <p14:creationId xmlns:p14="http://schemas.microsoft.com/office/powerpoint/2010/main" val="2134727940"/>
+      </p:ext>
+    </p:extLst>
+  </p:cSld>
+  <p:clrMapOvr>
+    <a:masterClrMapping/>
+  </p:clrMapOvr>
+  <p:transition spd="med">
+    <p:pull/>
+  </p:transition>
 </p:sld>
 </file>
 

</xml_diff>